<commit_message>
Working on Boyd presentation.
</commit_message>
<xml_diff>
--- a/present/DivisionOfLabor.pptx
+++ b/present/DivisionOfLabor.pptx
@@ -11,8 +11,10 @@
     <p:sldId id="259" r:id="rId5"/>
     <p:sldId id="260" r:id="rId6"/>
     <p:sldId id="261" r:id="rId7"/>
-    <p:sldId id="262" r:id="rId8"/>
-    <p:sldId id="263" r:id="rId9"/>
+    <p:sldId id="264" r:id="rId8"/>
+    <p:sldId id="265" r:id="rId9"/>
+    <p:sldId id="262" r:id="rId10"/>
+    <p:sldId id="263" r:id="rId11"/>
   </p:sldIdLst>
   <p:sldSz cx="12192000" cy="6858000"/>
   <p:notesSz cx="6858000" cy="9144000"/>
@@ -111,6 +113,11 @@
       </a:defRPr>
     </a:lvl9pPr>
   </p:defaultTextStyle>
+  <p:extLst>
+    <p:ext uri="{EFAFB233-063F-42B5-8137-9DF3F51BA10A}">
+      <p15:sldGuideLst xmlns:p15="http://schemas.microsoft.com/office/powerpoint/2012/main"/>
+    </p:ext>
+  </p:extLst>
 </p:presentation>
 </file>
 
@@ -358,7 +365,7 @@
           <a:p>
             <a:fld id="{9184DA70-C731-4C70-880D-CCD4705E623C}" type="datetime1">
               <a:rPr lang="en-US" smtClean="0"/>
-              <a:t>10/19/24</a:t>
+              <a:t>10/22/24</a:t>
             </a:fld>
             <a:endParaRPr lang="en-US" dirty="0"/>
           </a:p>
@@ -546,7 +553,7 @@
           <a:p>
             <a:fld id="{B612A279-0833-481D-8C56-F67FD0AC6C50}" type="datetime1">
               <a:rPr lang="en-US" smtClean="0"/>
-              <a:t>10/19/24</a:t>
+              <a:t>10/22/24</a:t>
             </a:fld>
             <a:endParaRPr lang="en-US" dirty="0"/>
           </a:p>
@@ -788,7 +795,7 @@
           <a:p>
             <a:fld id="{6587DA83-5663-4C9C-B9AA-0B40A3DAFF81}" type="datetime1">
               <a:rPr lang="en-US" smtClean="0"/>
-              <a:t>10/19/24</a:t>
+              <a:t>10/22/24</a:t>
             </a:fld>
             <a:endParaRPr lang="en-US" dirty="0"/>
           </a:p>
@@ -976,7 +983,7 @@
           <a:p>
             <a:fld id="{4BE1D723-8F53-4F53-90B0-1982A396982E}" type="datetime1">
               <a:rPr lang="en-US" smtClean="0"/>
-              <a:t>10/19/24</a:t>
+              <a:t>10/22/24</a:t>
             </a:fld>
             <a:endParaRPr lang="en-US" dirty="0"/>
           </a:p>
@@ -1349,7 +1356,7 @@
           <a:p>
             <a:fld id="{97669AF7-7BEB-44E4-9852-375E34362B5B}" type="datetime1">
               <a:rPr lang="en-US" smtClean="0"/>
-              <a:t>10/19/24</a:t>
+              <a:t>10/22/24</a:t>
             </a:fld>
             <a:endParaRPr lang="en-US" dirty="0"/>
           </a:p>
@@ -1604,7 +1611,7 @@
           <a:p>
             <a:fld id="{BAAAC38D-0552-4C82-B593-E6124DFADBE2}" type="datetime1">
               <a:rPr lang="en-US" smtClean="0"/>
-              <a:t>10/19/24</a:t>
+              <a:t>10/22/24</a:t>
             </a:fld>
             <a:endParaRPr lang="en-US" dirty="0"/>
           </a:p>
@@ -2001,7 +2008,7 @@
           <a:p>
             <a:fld id="{D9DF0F1C-5577-4ACB-BB62-DF8F3C494C7E}" type="datetime1">
               <a:rPr lang="en-US" smtClean="0"/>
-              <a:t>10/19/24</a:t>
+              <a:t>10/22/24</a:t>
             </a:fld>
             <a:endParaRPr lang="en-US" dirty="0"/>
           </a:p>
@@ -2137,7 +2144,7 @@
           <a:p>
             <a:fld id="{1775B394-D9F9-4F0C-B15D-605F45CB9E9F}" type="datetime1">
               <a:rPr lang="en-US" smtClean="0"/>
-              <a:t>10/19/24</a:t>
+              <a:t>10/22/24</a:t>
             </a:fld>
             <a:endParaRPr lang="en-US" dirty="0"/>
           </a:p>
@@ -2294,7 +2301,7 @@
           <a:p>
             <a:fld id="{39667345-2558-425A-8533-9BFDBCE15005}" type="datetime1">
               <a:rPr lang="en-US" smtClean="0"/>
-              <a:t>10/19/24</a:t>
+              <a:t>10/22/24</a:t>
             </a:fld>
             <a:endParaRPr lang="en-US" dirty="0"/>
           </a:p>
@@ -2623,7 +2630,7 @@
           <a:p>
             <a:fld id="{92BEA474-078D-4E9B-9B14-09A87B19DC46}" type="datetime1">
               <a:rPr lang="en-US" smtClean="0"/>
-              <a:t>10/19/24</a:t>
+              <a:t>10/22/24</a:t>
             </a:fld>
             <a:endParaRPr lang="en-US" dirty="0"/>
           </a:p>
@@ -2973,7 +2980,7 @@
           <a:p>
             <a:fld id="{4907D986-8816-4272-A432-0437A28A9828}" type="datetime1">
               <a:rPr lang="en-US" smtClean="0"/>
-              <a:t>10/19/24</a:t>
+              <a:t>10/22/24</a:t>
             </a:fld>
             <a:endParaRPr lang="en-US" dirty="0"/>
           </a:p>
@@ -3234,7 +3241,7 @@
           <a:p>
             <a:fld id="{62D6E202-B606-4609-B914-27C9371A1F6D}" type="datetime1">
               <a:rPr lang="en-US" smtClean="0"/>
-              <a:t>10/19/24</a:t>
+              <a:t>10/22/24</a:t>
             </a:fld>
             <a:endParaRPr lang="en-US" dirty="0"/>
           </a:p>
@@ -4140,6 +4147,502 @@
 </p:sld>
 </file>
 
+<file path=ppt/slides/slide10.xml><?xml version="1.0" encoding="utf-8"?>
+<p:sld xmlns:a="http://schemas.openxmlformats.org/drawingml/2006/main" xmlns:r="http://schemas.openxmlformats.org/officeDocument/2006/relationships" xmlns:p="http://schemas.openxmlformats.org/presentationml/2006/main">
+  <p:cSld>
+    <p:bg>
+      <p:bgPr>
+        <a:solidFill>
+          <a:schemeClr val="bg1"/>
+        </a:solidFill>
+        <a:effectLst/>
+      </p:bgPr>
+    </p:bg>
+    <p:spTree>
+      <p:nvGrpSpPr>
+        <p:cNvPr id="1" name=""/>
+        <p:cNvGrpSpPr/>
+        <p:nvPr/>
+      </p:nvGrpSpPr>
+      <p:grpSpPr>
+        <a:xfrm>
+          <a:off x="0" y="0"/>
+          <a:ext cx="0" cy="0"/>
+          <a:chOff x="0" y="0"/>
+          <a:chExt cx="0" cy="0"/>
+        </a:xfrm>
+      </p:grpSpPr>
+      <p:sp useBgFill="1">
+        <p:nvSpPr>
+          <p:cNvPr id="17" name="Rectangle 16">
+            <a:extLst>
+              <a:ext uri="{FF2B5EF4-FFF2-40B4-BE49-F238E27FC236}">
+                <a16:creationId xmlns:a16="http://schemas.microsoft.com/office/drawing/2014/main" id="{0AB6E427-3F73-4C06-A5D5-AE52C3883B50}"/>
+              </a:ext>
+              <a:ext uri="{C183D7F6-B498-43B3-948B-1728B52AA6E4}">
+                <adec:decorative xmlns:adec="http://schemas.microsoft.com/office/drawing/2017/decorative" val="1"/>
+              </a:ext>
+            </a:extLst>
+          </p:cNvPr>
+          <p:cNvSpPr>
+            <a:spLocks noGrp="1" noRot="1" noChangeAspect="1" noMove="1" noResize="1" noEditPoints="1" noAdjustHandles="1" noChangeArrowheads="1" noChangeShapeType="1" noTextEdit="1"/>
+          </p:cNvSpPr>
+          <p:nvPr>
+            <p:extLst>
+              <p:ext uri="{386F3935-93C4-4BCD-93E2-E3B085C9AB24}">
+                <p16:designElem xmlns:p16="http://schemas.microsoft.com/office/powerpoint/2015/main" val="1"/>
+              </p:ext>
+            </p:extLst>
+          </p:nvPr>
+        </p:nvSpPr>
+        <p:spPr>
+          <a:xfrm>
+            <a:off x="5685" y="0"/>
+            <a:ext cx="12186315" cy="6858000"/>
+          </a:xfrm>
+          <a:prstGeom prst="rect">
+            <a:avLst/>
+          </a:prstGeom>
+          <a:ln>
+            <a:noFill/>
+          </a:ln>
+        </p:spPr>
+        <p:style>
+          <a:lnRef idx="2">
+            <a:schemeClr val="accent6">
+              <a:shade val="50000"/>
+            </a:schemeClr>
+          </a:lnRef>
+          <a:fillRef idx="1001">
+            <a:schemeClr val="lt1"/>
+          </a:fillRef>
+          <a:effectRef idx="0">
+            <a:schemeClr val="accent6"/>
+          </a:effectRef>
+          <a:fontRef idx="minor">
+            <a:schemeClr val="lt1"/>
+          </a:fontRef>
+        </p:style>
+        <p:txBody>
+          <a:bodyPr rtlCol="0" anchor="ctr"/>
+          <a:lstStyle/>
+          <a:p>
+            <a:pPr algn="ctr"/>
+            <a:endParaRPr lang="en-US"/>
+          </a:p>
+        </p:txBody>
+      </p:sp>
+      <p:sp>
+        <p:nvSpPr>
+          <p:cNvPr id="19" name="Rectangle 18">
+            <a:extLst>
+              <a:ext uri="{FF2B5EF4-FFF2-40B4-BE49-F238E27FC236}">
+                <a16:creationId xmlns:a16="http://schemas.microsoft.com/office/drawing/2014/main" id="{D8C9BDAA-0390-4B39-9B5C-BC95E5120DA4}"/>
+              </a:ext>
+              <a:ext uri="{C183D7F6-B498-43B3-948B-1728B52AA6E4}">
+                <adec:decorative xmlns:adec="http://schemas.microsoft.com/office/drawing/2017/decorative" val="1"/>
+              </a:ext>
+            </a:extLst>
+          </p:cNvPr>
+          <p:cNvSpPr>
+            <a:spLocks noGrp="1" noRot="1" noChangeAspect="1" noMove="1" noResize="1" noEditPoints="1" noAdjustHandles="1" noChangeArrowheads="1" noChangeShapeType="1" noTextEdit="1"/>
+          </p:cNvSpPr>
+          <p:nvPr>
+            <p:extLst>
+              <p:ext uri="{386F3935-93C4-4BCD-93E2-E3B085C9AB24}">
+                <p16:designElem xmlns:p16="http://schemas.microsoft.com/office/powerpoint/2015/main" val="1"/>
+              </p:ext>
+            </p:extLst>
+          </p:nvPr>
+        </p:nvSpPr>
+        <p:spPr>
+          <a:xfrm>
+            <a:off x="16" y="0"/>
+            <a:ext cx="4059919" cy="6858000"/>
+          </a:xfrm>
+          <a:prstGeom prst="rect">
+            <a:avLst/>
+          </a:prstGeom>
+          <a:solidFill>
+            <a:srgbClr val="E72983"/>
+          </a:solidFill>
+          <a:ln>
+            <a:noFill/>
+          </a:ln>
+        </p:spPr>
+        <p:style>
+          <a:lnRef idx="2">
+            <a:schemeClr val="accent1">
+              <a:shade val="50000"/>
+            </a:schemeClr>
+          </a:lnRef>
+          <a:fillRef idx="1">
+            <a:schemeClr val="accent1"/>
+          </a:fillRef>
+          <a:effectRef idx="0">
+            <a:schemeClr val="accent1"/>
+          </a:effectRef>
+          <a:fontRef idx="minor">
+            <a:schemeClr val="lt1"/>
+          </a:fontRef>
+        </p:style>
+        <p:txBody>
+          <a:bodyPr/>
+          <a:lstStyle/>
+          <a:p>
+            <a:endParaRPr lang="en-US"/>
+          </a:p>
+        </p:txBody>
+      </p:sp>
+      <p:sp>
+        <p:nvSpPr>
+          <p:cNvPr id="2" name="Title 1">
+            <a:extLst>
+              <a:ext uri="{FF2B5EF4-FFF2-40B4-BE49-F238E27FC236}">
+                <a16:creationId xmlns:a16="http://schemas.microsoft.com/office/drawing/2014/main" id="{C20F10D9-4399-41F3-EA8B-CDFD55F9D3A3}"/>
+              </a:ext>
+            </a:extLst>
+          </p:cNvPr>
+          <p:cNvSpPr>
+            <a:spLocks noGrp="1"/>
+          </p:cNvSpPr>
+          <p:nvPr>
+            <p:ph type="title"/>
+          </p:nvPr>
+        </p:nvSpPr>
+        <p:spPr>
+          <a:xfrm>
+            <a:off x="290623" y="516837"/>
+            <a:ext cx="3452037" cy="1085136"/>
+          </a:xfrm>
+        </p:spPr>
+        <p:txBody>
+          <a:bodyPr>
+            <a:normAutofit/>
+          </a:bodyPr>
+          <a:lstStyle/>
+          <a:p>
+            <a:r>
+              <a:rPr lang="en-US" sz="4000" dirty="0">
+                <a:solidFill>
+                  <a:srgbClr val="FFFFFF"/>
+                </a:solidFill>
+              </a:rPr>
+              <a:t>The Toyota Way</a:t>
+            </a:r>
+          </a:p>
+        </p:txBody>
+      </p:sp>
+      <p:cxnSp>
+        <p:nvCxnSpPr>
+          <p:cNvPr id="21" name="Straight Connector 20">
+            <a:extLst>
+              <a:ext uri="{FF2B5EF4-FFF2-40B4-BE49-F238E27FC236}">
+                <a16:creationId xmlns:a16="http://schemas.microsoft.com/office/drawing/2014/main" id="{E04A321A-A039-4720-87B4-66A4210E0D57}"/>
+              </a:ext>
+              <a:ext uri="{C183D7F6-B498-43B3-948B-1728B52AA6E4}">
+                <adec:decorative xmlns:adec="http://schemas.microsoft.com/office/drawing/2017/decorative" val="1"/>
+              </a:ext>
+            </a:extLst>
+          </p:cNvPr>
+          <p:cNvCxnSpPr>
+            <a:cxnSpLocks noGrp="1" noRot="1" noChangeAspect="1" noMove="1" noResize="1" noEditPoints="1" noAdjustHandles="1" noChangeArrowheads="1" noChangeShapeType="1"/>
+          </p:cNvCxnSpPr>
+          <p:nvPr>
+            <p:extLst>
+              <p:ext uri="{386F3935-93C4-4BCD-93E2-E3B085C9AB24}">
+                <p16:designElem xmlns:p16="http://schemas.microsoft.com/office/powerpoint/2015/main" val="1"/>
+              </p:ext>
+            </p:extLst>
+          </p:nvPr>
+        </p:nvCxnSpPr>
+        <p:spPr>
+          <a:xfrm>
+            <a:off x="571752" y="2638787"/>
+            <a:ext cx="2743200" cy="0"/>
+          </a:xfrm>
+          <a:prstGeom prst="line">
+            <a:avLst/>
+          </a:prstGeom>
+          <a:ln w="19050">
+            <a:solidFill>
+              <a:schemeClr val="accent1"/>
+            </a:solidFill>
+          </a:ln>
+        </p:spPr>
+        <p:style>
+          <a:lnRef idx="1">
+            <a:schemeClr val="accent1"/>
+          </a:lnRef>
+          <a:fillRef idx="0">
+            <a:schemeClr val="accent1"/>
+          </a:fillRef>
+          <a:effectRef idx="0">
+            <a:schemeClr val="accent1"/>
+          </a:effectRef>
+          <a:fontRef idx="minor">
+            <a:schemeClr val="tx1"/>
+          </a:fontRef>
+        </p:style>
+      </p:cxnSp>
+      <p:sp>
+        <p:nvSpPr>
+          <p:cNvPr id="3" name="Content Placeholder 2">
+            <a:extLst>
+              <a:ext uri="{FF2B5EF4-FFF2-40B4-BE49-F238E27FC236}">
+                <a16:creationId xmlns:a16="http://schemas.microsoft.com/office/drawing/2014/main" id="{5C2D5C13-E38F-E9D9-CA5A-3756664646DF}"/>
+              </a:ext>
+            </a:extLst>
+          </p:cNvPr>
+          <p:cNvSpPr>
+            <a:spLocks noGrp="1"/>
+          </p:cNvSpPr>
+          <p:nvPr>
+            <p:ph idx="1"/>
+          </p:nvPr>
+        </p:nvSpPr>
+        <p:spPr>
+          <a:xfrm>
+            <a:off x="290623" y="2268280"/>
+            <a:ext cx="3515833" cy="4072880"/>
+          </a:xfrm>
+        </p:spPr>
+        <p:txBody>
+          <a:bodyPr>
+            <a:normAutofit/>
+          </a:bodyPr>
+          <a:lstStyle/>
+          <a:p>
+            <a:pPr>
+              <a:lnSpc>
+                <a:spcPct val="90000"/>
+              </a:lnSpc>
+            </a:pPr>
+            <a:endParaRPr lang="en-US" sz="900" dirty="0">
+              <a:solidFill>
+                <a:srgbClr val="FFFFFF"/>
+              </a:solidFill>
+            </a:endParaRPr>
+          </a:p>
+          <a:p>
+            <a:pPr>
+              <a:lnSpc>
+                <a:spcPct val="90000"/>
+              </a:lnSpc>
+            </a:pPr>
+            <a:r>
+              <a:rPr lang="en-US" sz="1500" dirty="0">
+                <a:solidFill>
+                  <a:schemeClr val="accent4"/>
+                </a:solidFill>
+              </a:rPr>
+              <a:t>The right process will produce the right results</a:t>
+            </a:r>
+          </a:p>
+          <a:p>
+            <a:pPr>
+              <a:lnSpc>
+                <a:spcPct val="90000"/>
+              </a:lnSpc>
+              <a:buFont typeface="Courier New" panose="02070309020205020404" pitchFamily="49" charset="0"/>
+              <a:buChar char="o"/>
+            </a:pPr>
+            <a:r>
+              <a:rPr lang="en-US" sz="900" dirty="0">
+                <a:solidFill>
+                  <a:srgbClr val="FFFFFF"/>
+                </a:solidFill>
+              </a:rPr>
+              <a:t> </a:t>
+            </a:r>
+            <a:r>
+              <a:rPr lang="en-US" sz="1200" dirty="0">
+                <a:solidFill>
+                  <a:srgbClr val="FFFFFF"/>
+                </a:solidFill>
+              </a:rPr>
+              <a:t>Create continuous process flow to bring problems to the surface.</a:t>
+            </a:r>
+          </a:p>
+          <a:p>
+            <a:pPr>
+              <a:lnSpc>
+                <a:spcPct val="90000"/>
+              </a:lnSpc>
+              <a:buFont typeface="Courier New" panose="02070309020205020404" pitchFamily="49" charset="0"/>
+              <a:buChar char="o"/>
+            </a:pPr>
+            <a:r>
+              <a:rPr lang="en-US" sz="1200" dirty="0">
+                <a:solidFill>
+                  <a:srgbClr val="FFFFFF"/>
+                </a:solidFill>
+              </a:rPr>
+              <a:t> Use the "pull" system to avoid overproduction.</a:t>
+            </a:r>
+          </a:p>
+          <a:p>
+            <a:pPr>
+              <a:lnSpc>
+                <a:spcPct val="90000"/>
+              </a:lnSpc>
+              <a:buFont typeface="Courier New" panose="02070309020205020404" pitchFamily="49" charset="0"/>
+              <a:buChar char="o"/>
+            </a:pPr>
+            <a:r>
+              <a:rPr lang="en-US" sz="1200" dirty="0">
+                <a:solidFill>
+                  <a:srgbClr val="FFFFFF"/>
+                </a:solidFill>
+              </a:rPr>
+              <a:t> Level out the workload (</a:t>
+            </a:r>
+            <a:r>
+              <a:rPr lang="en-US" sz="1200" i="1" dirty="0" err="1">
+                <a:solidFill>
+                  <a:srgbClr val="FFFFFF"/>
+                </a:solidFill>
+              </a:rPr>
+              <a:t>heijunka</a:t>
+            </a:r>
+            <a:r>
+              <a:rPr lang="en-US" sz="1200" dirty="0">
+                <a:solidFill>
+                  <a:srgbClr val="FFFFFF"/>
+                </a:solidFill>
+              </a:rPr>
+              <a:t>). (Work like the tortoise, not the hare.)</a:t>
+            </a:r>
+          </a:p>
+          <a:p>
+            <a:pPr>
+              <a:lnSpc>
+                <a:spcPct val="90000"/>
+              </a:lnSpc>
+              <a:buFont typeface="Courier New" panose="02070309020205020404" pitchFamily="49" charset="0"/>
+              <a:buChar char="o"/>
+            </a:pPr>
+            <a:r>
+              <a:rPr lang="en-US" sz="1200" dirty="0">
+                <a:solidFill>
+                  <a:srgbClr val="FFFFFF"/>
+                </a:solidFill>
+              </a:rPr>
+              <a:t> Build a culture of stopping to fix problems, to get quality right from the start. (</a:t>
+            </a:r>
+            <a:r>
+              <a:rPr lang="en-US" sz="1200" i="1" dirty="0" err="1">
+                <a:solidFill>
+                  <a:srgbClr val="FFFFFF"/>
+                </a:solidFill>
+              </a:rPr>
+              <a:t>Jidoka</a:t>
+            </a:r>
+            <a:r>
+              <a:rPr lang="en-US" sz="1200" dirty="0">
+                <a:solidFill>
+                  <a:srgbClr val="FFFFFF"/>
+                </a:solidFill>
+              </a:rPr>
+              <a:t>)</a:t>
+            </a:r>
+          </a:p>
+          <a:p>
+            <a:pPr>
+              <a:lnSpc>
+                <a:spcPct val="90000"/>
+              </a:lnSpc>
+              <a:buFont typeface="Courier New" panose="02070309020205020404" pitchFamily="49" charset="0"/>
+              <a:buChar char="o"/>
+            </a:pPr>
+            <a:r>
+              <a:rPr lang="en-US" sz="1200" dirty="0">
+                <a:solidFill>
+                  <a:srgbClr val="FFFFFF"/>
+                </a:solidFill>
+              </a:rPr>
+              <a:t> Standardized tasks are the foundation for continuous improvement and employee empowerment.</a:t>
+            </a:r>
+          </a:p>
+          <a:p>
+            <a:pPr>
+              <a:lnSpc>
+                <a:spcPct val="90000"/>
+              </a:lnSpc>
+              <a:buFont typeface="Courier New" panose="02070309020205020404" pitchFamily="49" charset="0"/>
+              <a:buChar char="o"/>
+            </a:pPr>
+            <a:r>
+              <a:rPr lang="en-US" sz="1200" dirty="0">
+                <a:solidFill>
+                  <a:srgbClr val="FFFFFF"/>
+                </a:solidFill>
+              </a:rPr>
+              <a:t> Use visual control so no problems are hidden.</a:t>
+            </a:r>
+          </a:p>
+          <a:p>
+            <a:pPr>
+              <a:lnSpc>
+                <a:spcPct val="90000"/>
+              </a:lnSpc>
+              <a:buFont typeface="Courier New" panose="02070309020205020404" pitchFamily="49" charset="0"/>
+              <a:buChar char="o"/>
+            </a:pPr>
+            <a:r>
+              <a:rPr lang="en-US" sz="1200" dirty="0">
+                <a:solidFill>
+                  <a:srgbClr val="FFFFFF"/>
+                </a:solidFill>
+              </a:rPr>
+              <a:t> Use only reliable, thoroughly tested technology that serves your people and processes.</a:t>
+            </a:r>
+          </a:p>
+        </p:txBody>
+      </p:sp>
+      <p:pic>
+        <p:nvPicPr>
+          <p:cNvPr id="6" name="Picture 5" descr="A diagram of a process&#10;&#10;Description automatically generated">
+            <a:extLst>
+              <a:ext uri="{FF2B5EF4-FFF2-40B4-BE49-F238E27FC236}">
+                <a16:creationId xmlns:a16="http://schemas.microsoft.com/office/drawing/2014/main" id="{C8AE7262-4B97-32F2-3D9D-4FEF25E832B9}"/>
+              </a:ext>
+            </a:extLst>
+          </p:cNvPr>
+          <p:cNvPicPr>
+            <a:picLocks noChangeAspect="1"/>
+          </p:cNvPicPr>
+          <p:nvPr/>
+        </p:nvPicPr>
+        <p:blipFill>
+          <a:blip r:embed="rId2"/>
+          <a:stretch>
+            <a:fillRect/>
+          </a:stretch>
+        </p:blipFill>
+        <p:spPr>
+          <a:xfrm>
+            <a:off x="4742017" y="1941920"/>
+            <a:ext cx="6798082" cy="2974160"/>
+          </a:xfrm>
+          <a:prstGeom prst="rect">
+            <a:avLst/>
+          </a:prstGeom>
+        </p:spPr>
+      </p:pic>
+    </p:spTree>
+    <p:extLst>
+      <p:ext uri="{BB962C8B-B14F-4D97-AF65-F5344CB8AC3E}">
+        <p14:creationId xmlns:p14="http://schemas.microsoft.com/office/powerpoint/2010/main" val="1801810148"/>
+      </p:ext>
+    </p:extLst>
+  </p:cSld>
+  <p:clrMapOvr>
+    <a:masterClrMapping/>
+  </p:clrMapOvr>
+</p:sld>
+</file>
+
 <file path=ppt/slides/slide2.xml><?xml version="1.0" encoding="utf-8"?>
 <p:sld xmlns:a="http://schemas.openxmlformats.org/drawingml/2006/main" xmlns:r="http://schemas.openxmlformats.org/officeDocument/2006/relationships" xmlns:p="http://schemas.openxmlformats.org/presentationml/2006/main">
   <p:cSld>
@@ -5521,10 +6024,10 @@
       </p:grpSpPr>
       <p:sp useBgFill="1">
         <p:nvSpPr>
-          <p:cNvPr id="14" name="Rectangle 13">
-            <a:extLst>
-              <a:ext uri="{FF2B5EF4-FFF2-40B4-BE49-F238E27FC236}">
-                <a16:creationId xmlns:a16="http://schemas.microsoft.com/office/drawing/2014/main" id="{990D0034-F768-41E7-85D4-F38C4DE85770}"/>
+          <p:cNvPr id="11" name="Rectangle 10">
+            <a:extLst>
+              <a:ext uri="{FF2B5EF4-FFF2-40B4-BE49-F238E27FC236}">
+                <a16:creationId xmlns:a16="http://schemas.microsoft.com/office/drawing/2014/main" id="{08CB54FC-0B2A-4107-9A70-958B90B76585}"/>
               </a:ext>
               <a:ext uri="{C183D7F6-B498-43B3-948B-1728B52AA6E4}">
                 <adec:decorative xmlns:adec="http://schemas.microsoft.com/office/drawing/2017/decorative" val="1"/>
@@ -5544,8 +6047,8 @@
         </p:nvSpPr>
         <p:spPr>
           <a:xfrm>
-            <a:off x="5685" y="0"/>
-            <a:ext cx="12186315" cy="6858000"/>
+            <a:off x="0" y="0"/>
+            <a:ext cx="12192001" cy="6858000"/>
           </a:xfrm>
           <a:prstGeom prst="rect">
             <a:avLst/>
@@ -5556,15 +6059,15 @@
         </p:spPr>
         <p:style>
           <a:lnRef idx="2">
-            <a:schemeClr val="accent6">
+            <a:schemeClr val="accent1">
               <a:shade val="50000"/>
             </a:schemeClr>
           </a:lnRef>
-          <a:fillRef idx="1001">
-            <a:schemeClr val="lt1"/>
+          <a:fillRef idx="1">
+            <a:schemeClr val="accent1"/>
           </a:fillRef>
           <a:effectRef idx="0">
-            <a:schemeClr val="accent6"/>
+            <a:schemeClr val="accent1"/>
           </a:effectRef>
           <a:fontRef idx="minor">
             <a:schemeClr val="lt1"/>
@@ -5584,7 +6087,7 @@
           <p:cNvPr id="2" name="Title 1">
             <a:extLst>
               <a:ext uri="{FF2B5EF4-FFF2-40B4-BE49-F238E27FC236}">
-                <a16:creationId xmlns:a16="http://schemas.microsoft.com/office/drawing/2014/main" id="{8DCEFF65-88F2-B886-9BA8-BBA5358602A3}"/>
+                <a16:creationId xmlns:a16="http://schemas.microsoft.com/office/drawing/2014/main" id="{28893D95-DFD6-18B7-8174-9C876377403B}"/>
               </a:ext>
             </a:extLst>
           </p:cNvPr>
@@ -5597,8 +6100,8 @@
         </p:nvSpPr>
         <p:spPr>
           <a:xfrm>
-            <a:off x="8614786" y="516836"/>
-            <a:ext cx="3100136" cy="1960234"/>
+            <a:off x="6411685" y="634946"/>
+            <a:ext cx="5127171" cy="1450757"/>
           </a:xfrm>
         </p:spPr>
         <p:txBody>
@@ -5608,22 +6111,18 @@
           <a:lstStyle/>
           <a:p>
             <a:r>
-              <a:rPr lang="en-US" sz="4400">
-                <a:solidFill>
-                  <a:srgbClr val="E72983"/>
-                </a:solidFill>
-              </a:rPr>
-              <a:t>Toyota</a:t>
+              <a:rPr lang="en-US" sz="4900" dirty="0"/>
+              <a:t>The Factory Model Applied to Software</a:t>
             </a:r>
           </a:p>
         </p:txBody>
       </p:sp>
       <p:pic>
         <p:nvPicPr>
-          <p:cNvPr id="7" name="Content Placeholder 6">
-            <a:extLst>
-              <a:ext uri="{FF2B5EF4-FFF2-40B4-BE49-F238E27FC236}">
-                <a16:creationId xmlns:a16="http://schemas.microsoft.com/office/drawing/2014/main" id="{22E548EE-09EF-D4CC-B78B-F046D223457E}"/>
+          <p:cNvPr id="4" name="Content Placeholder 3">
+            <a:extLst>
+              <a:ext uri="{FF2B5EF4-FFF2-40B4-BE49-F238E27FC236}">
+                <a16:creationId xmlns:a16="http://schemas.microsoft.com/office/drawing/2014/main" id="{164C1982-FD27-EF85-CF27-A79D036B5BFB}"/>
               </a:ext>
             </a:extLst>
           </p:cNvPr>
@@ -5634,13 +6133,14 @@
         </p:nvPicPr>
         <p:blipFill>
           <a:blip r:embed="rId2"/>
-          <a:srcRect l="13024" r="20446"/>
-          <a:stretch/>
+          <a:stretch>
+            <a:fillRect/>
+          </a:stretch>
         </p:blipFill>
         <p:spPr>
           <a:xfrm>
-            <a:off x="-1" y="10"/>
-            <a:ext cx="8111272" cy="6857990"/>
+            <a:off x="643192" y="1500412"/>
+            <a:ext cx="5115347" cy="3537134"/>
           </a:xfrm>
           <a:prstGeom prst="rect">
             <a:avLst/>
@@ -5649,10 +6149,10 @@
       </p:pic>
       <p:cxnSp>
         <p:nvCxnSpPr>
-          <p:cNvPr id="16" name="Straight Connector 15">
-            <a:extLst>
-              <a:ext uri="{FF2B5EF4-FFF2-40B4-BE49-F238E27FC236}">
-                <a16:creationId xmlns:a16="http://schemas.microsoft.com/office/drawing/2014/main" id="{5A0A5CF6-407C-4691-8122-49DF69D0020D}"/>
+          <p:cNvPr id="13" name="Straight Connector 12">
+            <a:extLst>
+              <a:ext uri="{FF2B5EF4-FFF2-40B4-BE49-F238E27FC236}">
+                <a16:creationId xmlns:a16="http://schemas.microsoft.com/office/drawing/2014/main" id="{7855A9B5-1710-4B19-B0F1-CDFDD4ED5B7E}"/>
               </a:ext>
               <a:ext uri="{C183D7F6-B498-43B3-948B-1728B52AA6E4}">
                 <adec:decorative xmlns:adec="http://schemas.microsoft.com/office/drawing/2017/decorative" val="1"/>
@@ -5672,8 +6172,8 @@
         </p:nvCxnSpPr>
         <p:spPr>
           <a:xfrm>
-            <a:off x="8730145" y="2633962"/>
-            <a:ext cx="2926080" cy="0"/>
+            <a:off x="6514044" y="2246569"/>
+            <a:ext cx="4572000" cy="0"/>
           </a:xfrm>
           <a:prstGeom prst="line">
             <a:avLst/>
@@ -5704,10 +6204,10 @@
       </p:cxnSp>
       <p:sp>
         <p:nvSpPr>
-          <p:cNvPr id="11" name="Content Placeholder 10">
-            <a:extLst>
-              <a:ext uri="{FF2B5EF4-FFF2-40B4-BE49-F238E27FC236}">
-                <a16:creationId xmlns:a16="http://schemas.microsoft.com/office/drawing/2014/main" id="{2508E9ED-F2A4-7E54-16CB-5DD13FF0042E}"/>
+          <p:cNvPr id="8" name="Content Placeholder 7">
+            <a:extLst>
+              <a:ext uri="{FF2B5EF4-FFF2-40B4-BE49-F238E27FC236}">
+                <a16:creationId xmlns:a16="http://schemas.microsoft.com/office/drawing/2014/main" id="{0914BFEB-8B48-25A9-0161-84961392B359}"/>
               </a:ext>
             </a:extLst>
           </p:cNvPr>
@@ -5720,8 +6220,8 @@
         </p:nvSpPr>
         <p:spPr>
           <a:xfrm>
-            <a:off x="8614786" y="3429000"/>
-            <a:ext cx="3084844" cy="1519514"/>
+            <a:off x="6411684" y="2658140"/>
+            <a:ext cx="5127172" cy="3210953"/>
           </a:xfrm>
         </p:spPr>
         <p:txBody>
@@ -5730,22 +6230,103 @@
           </a:bodyPr>
           <a:lstStyle/>
           <a:p>
-            <a:r>
-              <a:rPr lang="en-US" sz="1600" dirty="0"/>
-              <a:t>“Toyota’s real innovation is its ability to harness the intellect of ‘ordinary’ employees” – Mary and Tom </a:t>
-            </a:r>
-            <a:r>
-              <a:rPr lang="en-US" sz="1600" dirty="0" err="1"/>
-              <a:t>Poppendieck</a:t>
-            </a:r>
-            <a:endParaRPr lang="en-US" sz="1600" dirty="0"/>
+            <a:pPr>
+              <a:buFont typeface="Arial" panose="020B0604020202020204" pitchFamily="34" charset="0"/>
+              <a:buChar char="•"/>
+            </a:pPr>
+            <a:r>
+              <a:rPr lang="en-US" dirty="0"/>
+              <a:t> Intelligence is concentrated in the first two steps.</a:t>
+            </a:r>
+          </a:p>
+          <a:p>
+            <a:pPr>
+              <a:buFont typeface="Arial" panose="020B0604020202020204" pitchFamily="34" charset="0"/>
+              <a:buChar char="•"/>
+            </a:pPr>
+            <a:r>
+              <a:rPr lang="en-US" dirty="0"/>
+              <a:t> “Coders” are the equivalent of factory workers.</a:t>
+            </a:r>
+          </a:p>
+          <a:p>
+            <a:pPr>
+              <a:buFont typeface="Arial" panose="020B0604020202020204" pitchFamily="34" charset="0"/>
+              <a:buChar char="•"/>
+            </a:pPr>
+            <a:r>
+              <a:rPr lang="en-US" dirty="0"/>
+              <a:t> The method assumes the product that is needed is known at the start.</a:t>
+            </a:r>
+          </a:p>
+        </p:txBody>
+      </p:sp>
+      <p:sp>
+        <p:nvSpPr>
+          <p:cNvPr id="15" name="Rectangle 14">
+            <a:extLst>
+              <a:ext uri="{FF2B5EF4-FFF2-40B4-BE49-F238E27FC236}">
+                <a16:creationId xmlns:a16="http://schemas.microsoft.com/office/drawing/2014/main" id="{9AA76026-5689-4584-8D93-D71D739E61B5}"/>
+              </a:ext>
+              <a:ext uri="{C183D7F6-B498-43B3-948B-1728B52AA6E4}">
+                <adec:decorative xmlns:adec="http://schemas.microsoft.com/office/drawing/2017/decorative" val="1"/>
+              </a:ext>
+            </a:extLst>
+          </p:cNvPr>
+          <p:cNvSpPr>
+            <a:spLocks noGrp="1" noRot="1" noChangeAspect="1" noMove="1" noResize="1" noEditPoints="1" noAdjustHandles="1" noChangeArrowheads="1" noChangeShapeType="1" noTextEdit="1"/>
+          </p:cNvSpPr>
+          <p:nvPr>
+            <p:extLst>
+              <p:ext uri="{386F3935-93C4-4BCD-93E2-E3B085C9AB24}">
+                <p16:designElem xmlns:p16="http://schemas.microsoft.com/office/powerpoint/2015/main" val="1"/>
+              </p:ext>
+            </p:extLst>
+          </p:nvPr>
+        </p:nvSpPr>
+        <p:spPr>
+          <a:xfrm>
+            <a:off x="0" y="6400800"/>
+            <a:ext cx="12192000" cy="457200"/>
+          </a:xfrm>
+          <a:prstGeom prst="rect">
+            <a:avLst/>
+          </a:prstGeom>
+          <a:solidFill>
+            <a:srgbClr val="262626"/>
+          </a:solidFill>
+          <a:ln>
+            <a:noFill/>
+          </a:ln>
+        </p:spPr>
+        <p:style>
+          <a:lnRef idx="2">
+            <a:schemeClr val="accent1">
+              <a:shade val="50000"/>
+            </a:schemeClr>
+          </a:lnRef>
+          <a:fillRef idx="1">
+            <a:schemeClr val="accent1"/>
+          </a:fillRef>
+          <a:effectRef idx="0">
+            <a:schemeClr val="accent1"/>
+          </a:effectRef>
+          <a:fontRef idx="minor">
+            <a:schemeClr val="lt1"/>
+          </a:fontRef>
+        </p:style>
+        <p:txBody>
+          <a:bodyPr/>
+          <a:lstStyle/>
+          <a:p>
+            <a:endParaRPr lang="en-US"/>
           </a:p>
         </p:txBody>
       </p:sp>
     </p:spTree>
     <p:extLst>
       <p:ext uri="{BB962C8B-B14F-4D97-AF65-F5344CB8AC3E}">
-        <p14:creationId xmlns:p14="http://schemas.microsoft.com/office/powerpoint/2010/main" val="945415510"/>
+        <p14:creationId xmlns:p14="http://schemas.microsoft.com/office/powerpoint/2010/main" val="839550392"/>
       </p:ext>
     </p:extLst>
   </p:cSld>
@@ -5782,10 +6363,373 @@
       </p:grpSpPr>
       <p:sp useBgFill="1">
         <p:nvSpPr>
-          <p:cNvPr id="17" name="Rectangle 16">
-            <a:extLst>
-              <a:ext uri="{FF2B5EF4-FFF2-40B4-BE49-F238E27FC236}">
-                <a16:creationId xmlns:a16="http://schemas.microsoft.com/office/drawing/2014/main" id="{0AB6E427-3F73-4C06-A5D5-AE52C3883B50}"/>
+          <p:cNvPr id="11" name="Rectangle 10">
+            <a:extLst>
+              <a:ext uri="{FF2B5EF4-FFF2-40B4-BE49-F238E27FC236}">
+                <a16:creationId xmlns:a16="http://schemas.microsoft.com/office/drawing/2014/main" id="{D40791F6-715D-481A-9C4A-3645AECFD5A0}"/>
+              </a:ext>
+              <a:ext uri="{C183D7F6-B498-43B3-948B-1728B52AA6E4}">
+                <adec:decorative xmlns:adec="http://schemas.microsoft.com/office/drawing/2017/decorative" val="1"/>
+              </a:ext>
+            </a:extLst>
+          </p:cNvPr>
+          <p:cNvSpPr>
+            <a:spLocks noGrp="1" noRot="1" noChangeAspect="1" noMove="1" noResize="1" noEditPoints="1" noAdjustHandles="1" noChangeArrowheads="1" noChangeShapeType="1" noTextEdit="1"/>
+          </p:cNvSpPr>
+          <p:nvPr>
+            <p:extLst>
+              <p:ext uri="{386F3935-93C4-4BCD-93E2-E3B085C9AB24}">
+                <p16:designElem xmlns:p16="http://schemas.microsoft.com/office/powerpoint/2015/main" val="1"/>
+              </p:ext>
+            </p:extLst>
+          </p:nvPr>
+        </p:nvSpPr>
+        <p:spPr>
+          <a:xfrm>
+            <a:off x="0" y="0"/>
+            <a:ext cx="12192001" cy="6858000"/>
+          </a:xfrm>
+          <a:prstGeom prst="rect">
+            <a:avLst/>
+          </a:prstGeom>
+          <a:ln>
+            <a:noFill/>
+          </a:ln>
+        </p:spPr>
+        <p:style>
+          <a:lnRef idx="2">
+            <a:schemeClr val="accent1">
+              <a:shade val="50000"/>
+            </a:schemeClr>
+          </a:lnRef>
+          <a:fillRef idx="1">
+            <a:schemeClr val="accent1"/>
+          </a:fillRef>
+          <a:effectRef idx="0">
+            <a:schemeClr val="accent1"/>
+          </a:effectRef>
+          <a:fontRef idx="minor">
+            <a:schemeClr val="lt1"/>
+          </a:fontRef>
+        </p:style>
+        <p:txBody>
+          <a:bodyPr rtlCol="0" anchor="ctr"/>
+          <a:lstStyle/>
+          <a:p>
+            <a:pPr algn="ctr"/>
+            <a:endParaRPr lang="en-US"/>
+          </a:p>
+        </p:txBody>
+      </p:sp>
+      <p:sp>
+        <p:nvSpPr>
+          <p:cNvPr id="2" name="Title 1">
+            <a:extLst>
+              <a:ext uri="{FF2B5EF4-FFF2-40B4-BE49-F238E27FC236}">
+                <a16:creationId xmlns:a16="http://schemas.microsoft.com/office/drawing/2014/main" id="{8BF54272-5398-FE9D-60F7-05F7BB5A2B1A}"/>
+              </a:ext>
+            </a:extLst>
+          </p:cNvPr>
+          <p:cNvSpPr>
+            <a:spLocks noGrp="1"/>
+          </p:cNvSpPr>
+          <p:nvPr>
+            <p:ph type="title"/>
+          </p:nvPr>
+        </p:nvSpPr>
+        <p:spPr>
+          <a:xfrm>
+            <a:off x="5117309" y="634946"/>
+            <a:ext cx="6432434" cy="1450757"/>
+          </a:xfrm>
+        </p:spPr>
+        <p:txBody>
+          <a:bodyPr>
+            <a:normAutofit/>
+          </a:bodyPr>
+          <a:lstStyle/>
+          <a:p>
+            <a:r>
+              <a:rPr lang="en-US" sz="4100" dirty="0"/>
+              <a:t>Building New Software Is Like Building a New Warehouse</a:t>
+            </a:r>
+          </a:p>
+        </p:txBody>
+      </p:sp>
+      <p:pic>
+        <p:nvPicPr>
+          <p:cNvPr id="4" name="Content Placeholder 3">
+            <a:extLst>
+              <a:ext uri="{FF2B5EF4-FFF2-40B4-BE49-F238E27FC236}">
+                <a16:creationId xmlns:a16="http://schemas.microsoft.com/office/drawing/2014/main" id="{1F667819-2A78-CEFC-1CCF-8D7D0362FCED}"/>
+              </a:ext>
+            </a:extLst>
+          </p:cNvPr>
+          <p:cNvPicPr>
+            <a:picLocks noChangeAspect="1"/>
+          </p:cNvPicPr>
+          <p:nvPr/>
+        </p:nvPicPr>
+        <p:blipFill>
+          <a:blip r:embed="rId2"/>
+          <a:srcRect t="388" r="2" b="2"/>
+          <a:stretch/>
+        </p:blipFill>
+        <p:spPr>
+          <a:xfrm>
+            <a:off x="633999" y="640081"/>
+            <a:ext cx="4001315" cy="5314406"/>
+          </a:xfrm>
+          <a:prstGeom prst="rect">
+            <a:avLst/>
+          </a:prstGeom>
+        </p:spPr>
+      </p:pic>
+      <p:cxnSp>
+        <p:nvCxnSpPr>
+          <p:cNvPr id="13" name="Straight Connector 12">
+            <a:extLst>
+              <a:ext uri="{FF2B5EF4-FFF2-40B4-BE49-F238E27FC236}">
+                <a16:creationId xmlns:a16="http://schemas.microsoft.com/office/drawing/2014/main" id="{740F83A4-FAC4-4867-95A5-BBFD280C7BF5}"/>
+              </a:ext>
+              <a:ext uri="{C183D7F6-B498-43B3-948B-1728B52AA6E4}">
+                <adec:decorative xmlns:adec="http://schemas.microsoft.com/office/drawing/2017/decorative" val="1"/>
+              </a:ext>
+            </a:extLst>
+          </p:cNvPr>
+          <p:cNvCxnSpPr>
+            <a:cxnSpLocks noGrp="1" noRot="1" noChangeAspect="1" noMove="1" noResize="1" noEditPoints="1" noAdjustHandles="1" noChangeArrowheads="1" noChangeShapeType="1"/>
+          </p:cNvCxnSpPr>
+          <p:nvPr>
+            <p:extLst>
+              <p:ext uri="{386F3935-93C4-4BCD-93E2-E3B085C9AB24}">
+                <p16:designElem xmlns:p16="http://schemas.microsoft.com/office/powerpoint/2015/main" val="1"/>
+              </p:ext>
+            </p:extLst>
+          </p:nvPr>
+        </p:nvCxnSpPr>
+        <p:spPr>
+          <a:xfrm>
+            <a:off x="5180720" y="2267421"/>
+            <a:ext cx="6035040" cy="0"/>
+          </a:xfrm>
+          <a:prstGeom prst="line">
+            <a:avLst/>
+          </a:prstGeom>
+          <a:ln w="12700">
+            <a:solidFill>
+              <a:schemeClr val="tx1">
+                <a:lumMod val="75000"/>
+                <a:lumOff val="25000"/>
+              </a:schemeClr>
+            </a:solidFill>
+          </a:ln>
+        </p:spPr>
+        <p:style>
+          <a:lnRef idx="1">
+            <a:schemeClr val="accent1"/>
+          </a:lnRef>
+          <a:fillRef idx="0">
+            <a:schemeClr val="accent1"/>
+          </a:fillRef>
+          <a:effectRef idx="0">
+            <a:schemeClr val="accent1"/>
+          </a:effectRef>
+          <a:fontRef idx="minor">
+            <a:schemeClr val="tx1"/>
+          </a:fontRef>
+        </p:style>
+      </p:cxnSp>
+      <p:sp>
+        <p:nvSpPr>
+          <p:cNvPr id="8" name="Content Placeholder 7">
+            <a:extLst>
+              <a:ext uri="{FF2B5EF4-FFF2-40B4-BE49-F238E27FC236}">
+                <a16:creationId xmlns:a16="http://schemas.microsoft.com/office/drawing/2014/main" id="{19F7131B-B4FE-BBC7-2083-4CFFF1314A69}"/>
+              </a:ext>
+            </a:extLst>
+          </p:cNvPr>
+          <p:cNvSpPr>
+            <a:spLocks noGrp="1"/>
+          </p:cNvSpPr>
+          <p:nvPr>
+            <p:ph idx="1"/>
+          </p:nvPr>
+        </p:nvSpPr>
+        <p:spPr>
+          <a:xfrm>
+            <a:off x="5117308" y="2407436"/>
+            <a:ext cx="6432434" cy="3461658"/>
+          </a:xfrm>
+        </p:spPr>
+        <p:txBody>
+          <a:bodyPr>
+            <a:normAutofit/>
+          </a:bodyPr>
+          <a:lstStyle/>
+          <a:p>
+            <a:pPr>
+              <a:buFont typeface="Arial" panose="020B0604020202020204" pitchFamily="34" charset="0"/>
+              <a:buChar char="•"/>
+            </a:pPr>
+            <a:r>
+              <a:rPr lang="en-US" dirty="0"/>
+              <a:t> We know (almost) exactly what we need.</a:t>
+            </a:r>
+          </a:p>
+          <a:p>
+            <a:pPr>
+              <a:buFont typeface="Arial" panose="020B0604020202020204" pitchFamily="34" charset="0"/>
+              <a:buChar char="•"/>
+            </a:pPr>
+            <a:r>
+              <a:rPr lang="en-US" dirty="0"/>
+              <a:t> All “blueprints” can be drawn up in advance.</a:t>
+            </a:r>
+          </a:p>
+          <a:p>
+            <a:pPr>
+              <a:buFont typeface="Arial" panose="020B0604020202020204" pitchFamily="34" charset="0"/>
+              <a:buChar char="•"/>
+            </a:pPr>
+            <a:r>
+              <a:rPr lang="en-US" dirty="0"/>
+              <a:t> Surprises are very unlikely. (Earthquake? Revoked zoning permission?)</a:t>
+            </a:r>
+          </a:p>
+          <a:p>
+            <a:pPr>
+              <a:buFont typeface="Arial" panose="020B0604020202020204" pitchFamily="34" charset="0"/>
+              <a:buChar char="•"/>
+            </a:pPr>
+            <a:r>
+              <a:rPr lang="en-US" dirty="0"/>
+              <a:t> The basic technology is stable.</a:t>
+            </a:r>
+          </a:p>
+          <a:p>
+            <a:pPr>
+              <a:buFont typeface="Arial" panose="020B0604020202020204" pitchFamily="34" charset="0"/>
+              <a:buChar char="•"/>
+            </a:pPr>
+            <a:r>
+              <a:rPr lang="en-US" dirty="0"/>
+              <a:t> Of course, all is different if one is building a </a:t>
+            </a:r>
+            <a:r>
+              <a:rPr lang="en-US"/>
+              <a:t>cutting-edge warehouse!</a:t>
+            </a:r>
+            <a:endParaRPr lang="en-US" dirty="0"/>
+          </a:p>
+        </p:txBody>
+      </p:sp>
+      <p:sp>
+        <p:nvSpPr>
+          <p:cNvPr id="15" name="Rectangle 14">
+            <a:extLst>
+              <a:ext uri="{FF2B5EF4-FFF2-40B4-BE49-F238E27FC236}">
+                <a16:creationId xmlns:a16="http://schemas.microsoft.com/office/drawing/2014/main" id="{811CBAFA-D7E0-40A7-BB94-2C05304B407B}"/>
+              </a:ext>
+              <a:ext uri="{C183D7F6-B498-43B3-948B-1728B52AA6E4}">
+                <adec:decorative xmlns:adec="http://schemas.microsoft.com/office/drawing/2017/decorative" val="1"/>
+              </a:ext>
+            </a:extLst>
+          </p:cNvPr>
+          <p:cNvSpPr>
+            <a:spLocks noGrp="1" noRot="1" noChangeAspect="1" noMove="1" noResize="1" noEditPoints="1" noAdjustHandles="1" noChangeArrowheads="1" noChangeShapeType="1" noTextEdit="1"/>
+          </p:cNvSpPr>
+          <p:nvPr>
+            <p:extLst>
+              <p:ext uri="{386F3935-93C4-4BCD-93E2-E3B085C9AB24}">
+                <p16:designElem xmlns:p16="http://schemas.microsoft.com/office/powerpoint/2015/main" val="1"/>
+              </p:ext>
+            </p:extLst>
+          </p:nvPr>
+        </p:nvSpPr>
+        <p:spPr>
+          <a:xfrm>
+            <a:off x="1" y="6400800"/>
+            <a:ext cx="12192000" cy="457200"/>
+          </a:xfrm>
+          <a:prstGeom prst="rect">
+            <a:avLst/>
+          </a:prstGeom>
+          <a:solidFill>
+            <a:srgbClr val="262626"/>
+          </a:solidFill>
+          <a:ln>
+            <a:noFill/>
+          </a:ln>
+        </p:spPr>
+        <p:style>
+          <a:lnRef idx="2">
+            <a:schemeClr val="accent1">
+              <a:shade val="50000"/>
+            </a:schemeClr>
+          </a:lnRef>
+          <a:fillRef idx="1">
+            <a:schemeClr val="accent1"/>
+          </a:fillRef>
+          <a:effectRef idx="0">
+            <a:schemeClr val="accent1"/>
+          </a:effectRef>
+          <a:fontRef idx="minor">
+            <a:schemeClr val="lt1"/>
+          </a:fontRef>
+        </p:style>
+        <p:txBody>
+          <a:bodyPr/>
+          <a:lstStyle/>
+          <a:p>
+            <a:endParaRPr lang="en-US"/>
+          </a:p>
+        </p:txBody>
+      </p:sp>
+    </p:spTree>
+    <p:extLst>
+      <p:ext uri="{BB962C8B-B14F-4D97-AF65-F5344CB8AC3E}">
+        <p14:creationId xmlns:p14="http://schemas.microsoft.com/office/powerpoint/2010/main" val="4055008323"/>
+      </p:ext>
+    </p:extLst>
+  </p:cSld>
+  <p:clrMapOvr>
+    <a:masterClrMapping/>
+  </p:clrMapOvr>
+</p:sld>
+</file>
+
+<file path=ppt/slides/slide9.xml><?xml version="1.0" encoding="utf-8"?>
+<p:sld xmlns:a="http://schemas.openxmlformats.org/drawingml/2006/main" xmlns:r="http://schemas.openxmlformats.org/officeDocument/2006/relationships" xmlns:p="http://schemas.openxmlformats.org/presentationml/2006/main">
+  <p:cSld>
+    <p:bg>
+      <p:bgPr>
+        <a:solidFill>
+          <a:schemeClr val="bg1"/>
+        </a:solidFill>
+        <a:effectLst/>
+      </p:bgPr>
+    </p:bg>
+    <p:spTree>
+      <p:nvGrpSpPr>
+        <p:cNvPr id="1" name=""/>
+        <p:cNvGrpSpPr/>
+        <p:nvPr/>
+      </p:nvGrpSpPr>
+      <p:grpSpPr>
+        <a:xfrm>
+          <a:off x="0" y="0"/>
+          <a:ext cx="0" cy="0"/>
+          <a:chOff x="0" y="0"/>
+          <a:chExt cx="0" cy="0"/>
+        </a:xfrm>
+      </p:grpSpPr>
+      <p:sp useBgFill="1">
+        <p:nvSpPr>
+          <p:cNvPr id="14" name="Rectangle 13">
+            <a:extLst>
+              <a:ext uri="{FF2B5EF4-FFF2-40B4-BE49-F238E27FC236}">
+                <a16:creationId xmlns:a16="http://schemas.microsoft.com/office/drawing/2014/main" id="{990D0034-F768-41E7-85D4-F38C4DE85770}"/>
               </a:ext>
               <a:ext uri="{C183D7F6-B498-43B3-948B-1728B52AA6E4}">
                 <adec:decorative xmlns:adec="http://schemas.microsoft.com/office/drawing/2017/decorative" val="1"/>
@@ -5842,72 +6786,10 @@
       </p:sp>
       <p:sp>
         <p:nvSpPr>
-          <p:cNvPr id="19" name="Rectangle 18">
-            <a:extLst>
-              <a:ext uri="{FF2B5EF4-FFF2-40B4-BE49-F238E27FC236}">
-                <a16:creationId xmlns:a16="http://schemas.microsoft.com/office/drawing/2014/main" id="{D8C9BDAA-0390-4B39-9B5C-BC95E5120DA4}"/>
-              </a:ext>
-              <a:ext uri="{C183D7F6-B498-43B3-948B-1728B52AA6E4}">
-                <adec:decorative xmlns:adec="http://schemas.microsoft.com/office/drawing/2017/decorative" val="1"/>
-              </a:ext>
-            </a:extLst>
-          </p:cNvPr>
-          <p:cNvSpPr>
-            <a:spLocks noGrp="1" noRot="1" noChangeAspect="1" noMove="1" noResize="1" noEditPoints="1" noAdjustHandles="1" noChangeArrowheads="1" noChangeShapeType="1" noTextEdit="1"/>
-          </p:cNvSpPr>
-          <p:nvPr>
-            <p:extLst>
-              <p:ext uri="{386F3935-93C4-4BCD-93E2-E3B085C9AB24}">
-                <p16:designElem xmlns:p16="http://schemas.microsoft.com/office/powerpoint/2015/main" val="1"/>
-              </p:ext>
-            </p:extLst>
-          </p:nvPr>
-        </p:nvSpPr>
-        <p:spPr>
-          <a:xfrm>
-            <a:off x="16" y="0"/>
-            <a:ext cx="4059919" cy="6858000"/>
-          </a:xfrm>
-          <a:prstGeom prst="rect">
-            <a:avLst/>
-          </a:prstGeom>
-          <a:solidFill>
-            <a:srgbClr val="E72983"/>
-          </a:solidFill>
-          <a:ln>
-            <a:noFill/>
-          </a:ln>
-        </p:spPr>
-        <p:style>
-          <a:lnRef idx="2">
-            <a:schemeClr val="accent1">
-              <a:shade val="50000"/>
-            </a:schemeClr>
-          </a:lnRef>
-          <a:fillRef idx="1">
-            <a:schemeClr val="accent1"/>
-          </a:fillRef>
-          <a:effectRef idx="0">
-            <a:schemeClr val="accent1"/>
-          </a:effectRef>
-          <a:fontRef idx="minor">
-            <a:schemeClr val="lt1"/>
-          </a:fontRef>
-        </p:style>
-        <p:txBody>
-          <a:bodyPr/>
-          <a:lstStyle/>
-          <a:p>
-            <a:endParaRPr lang="en-US"/>
-          </a:p>
-        </p:txBody>
-      </p:sp>
-      <p:sp>
-        <p:nvSpPr>
           <p:cNvPr id="2" name="Title 1">
             <a:extLst>
               <a:ext uri="{FF2B5EF4-FFF2-40B4-BE49-F238E27FC236}">
-                <a16:creationId xmlns:a16="http://schemas.microsoft.com/office/drawing/2014/main" id="{C20F10D9-4399-41F3-EA8B-CDFD55F9D3A3}"/>
+                <a16:creationId xmlns:a16="http://schemas.microsoft.com/office/drawing/2014/main" id="{8DCEFF65-88F2-B886-9BA8-BBA5358602A3}"/>
               </a:ext>
             </a:extLst>
           </p:cNvPr>
@@ -5920,8 +6802,8 @@
         </p:nvSpPr>
         <p:spPr>
           <a:xfrm>
-            <a:off x="492370" y="516836"/>
-            <a:ext cx="3084844" cy="1961086"/>
+            <a:off x="8614786" y="516836"/>
+            <a:ext cx="3100136" cy="1960234"/>
           </a:xfrm>
         </p:spPr>
         <p:txBody>
@@ -5931,281 +6813,22 @@
           <a:lstStyle/>
           <a:p>
             <a:r>
-              <a:rPr lang="en-US" sz="4000">
+              <a:rPr lang="en-US" sz="4400">
                 <a:solidFill>
-                  <a:srgbClr val="FFFFFF"/>
+                  <a:srgbClr val="E72983"/>
                 </a:solidFill>
               </a:rPr>
-              <a:t>The Toyota Way</a:t>
-            </a:r>
-          </a:p>
-        </p:txBody>
-      </p:sp>
-      <p:cxnSp>
-        <p:nvCxnSpPr>
-          <p:cNvPr id="21" name="Straight Connector 20">
-            <a:extLst>
-              <a:ext uri="{FF2B5EF4-FFF2-40B4-BE49-F238E27FC236}">
-                <a16:creationId xmlns:a16="http://schemas.microsoft.com/office/drawing/2014/main" id="{E04A321A-A039-4720-87B4-66A4210E0D57}"/>
-              </a:ext>
-              <a:ext uri="{C183D7F6-B498-43B3-948B-1728B52AA6E4}">
-                <adec:decorative xmlns:adec="http://schemas.microsoft.com/office/drawing/2017/decorative" val="1"/>
-              </a:ext>
-            </a:extLst>
-          </p:cNvPr>
-          <p:cNvCxnSpPr>
-            <a:cxnSpLocks noGrp="1" noRot="1" noChangeAspect="1" noMove="1" noResize="1" noEditPoints="1" noAdjustHandles="1" noChangeArrowheads="1" noChangeShapeType="1"/>
-          </p:cNvCxnSpPr>
-          <p:nvPr>
-            <p:extLst>
-              <p:ext uri="{386F3935-93C4-4BCD-93E2-E3B085C9AB24}">
-                <p16:designElem xmlns:p16="http://schemas.microsoft.com/office/powerpoint/2015/main" val="1"/>
-              </p:ext>
-            </p:extLst>
-          </p:nvPr>
-        </p:nvCxnSpPr>
-        <p:spPr>
-          <a:xfrm>
-            <a:off x="571752" y="2638787"/>
-            <a:ext cx="2743200" cy="0"/>
-          </a:xfrm>
-          <a:prstGeom prst="line">
-            <a:avLst/>
-          </a:prstGeom>
-          <a:ln w="19050">
-            <a:solidFill>
-              <a:schemeClr val="accent1"/>
-            </a:solidFill>
-          </a:ln>
-        </p:spPr>
-        <p:style>
-          <a:lnRef idx="1">
-            <a:schemeClr val="accent1"/>
-          </a:lnRef>
-          <a:fillRef idx="0">
-            <a:schemeClr val="accent1"/>
-          </a:fillRef>
-          <a:effectRef idx="0">
-            <a:schemeClr val="accent1"/>
-          </a:effectRef>
-          <a:fontRef idx="minor">
-            <a:schemeClr val="tx1"/>
-          </a:fontRef>
-        </p:style>
-      </p:cxnSp>
-      <p:sp>
-        <p:nvSpPr>
-          <p:cNvPr id="3" name="Content Placeholder 2">
-            <a:extLst>
-              <a:ext uri="{FF2B5EF4-FFF2-40B4-BE49-F238E27FC236}">
-                <a16:creationId xmlns:a16="http://schemas.microsoft.com/office/drawing/2014/main" id="{5C2D5C13-E38F-E9D9-CA5A-3756664646DF}"/>
-              </a:ext>
-            </a:extLst>
-          </p:cNvPr>
-          <p:cNvSpPr>
-            <a:spLocks noGrp="1"/>
-          </p:cNvSpPr>
-          <p:nvPr>
-            <p:ph idx="1"/>
-          </p:nvPr>
-        </p:nvSpPr>
-        <p:spPr>
-          <a:xfrm>
-            <a:off x="571752" y="2799654"/>
-            <a:ext cx="3005462" cy="3189665"/>
-          </a:xfrm>
-        </p:spPr>
-        <p:txBody>
-          <a:bodyPr>
-            <a:normAutofit lnSpcReduction="10000"/>
-          </a:bodyPr>
-          <a:lstStyle/>
-          <a:p>
-            <a:pPr>
-              <a:lnSpc>
-                <a:spcPct val="90000"/>
-              </a:lnSpc>
-            </a:pPr>
-            <a:endParaRPr lang="en-US" sz="900" dirty="0">
-              <a:solidFill>
-                <a:srgbClr val="FFFFFF"/>
-              </a:solidFill>
-            </a:endParaRPr>
-          </a:p>
-          <a:p>
-            <a:pPr>
-              <a:lnSpc>
-                <a:spcPct val="90000"/>
-              </a:lnSpc>
-            </a:pPr>
-            <a:r>
-              <a:rPr lang="en-US" sz="1400" dirty="0">
-                <a:solidFill>
-                  <a:schemeClr val="accent4"/>
-                </a:solidFill>
-              </a:rPr>
-              <a:t>The right process will produce the right results</a:t>
-            </a:r>
-          </a:p>
-          <a:p>
-            <a:pPr>
-              <a:lnSpc>
-                <a:spcPct val="90000"/>
-              </a:lnSpc>
-              <a:buFont typeface="Courier New" panose="02070309020205020404" pitchFamily="49" charset="0"/>
-              <a:buChar char="o"/>
-            </a:pPr>
-            <a:r>
-              <a:rPr lang="en-US" sz="900" dirty="0">
-                <a:solidFill>
-                  <a:srgbClr val="FFFFFF"/>
-                </a:solidFill>
-              </a:rPr>
-              <a:t> Create continuous process flow to bring problems to the surface.</a:t>
-            </a:r>
-          </a:p>
-          <a:p>
-            <a:pPr>
-              <a:lnSpc>
-                <a:spcPct val="90000"/>
-              </a:lnSpc>
-              <a:buFont typeface="Courier New" panose="02070309020205020404" pitchFamily="49" charset="0"/>
-              <a:buChar char="o"/>
-            </a:pPr>
-            <a:r>
-              <a:rPr lang="en-US" sz="900" dirty="0">
-                <a:solidFill>
-                  <a:srgbClr val="FFFFFF"/>
-                </a:solidFill>
-              </a:rPr>
-              <a:t> Use the "pull" system to avoid overproduction.</a:t>
-            </a:r>
-          </a:p>
-          <a:p>
-            <a:pPr>
-              <a:lnSpc>
-                <a:spcPct val="90000"/>
-              </a:lnSpc>
-              <a:buFont typeface="Courier New" panose="02070309020205020404" pitchFamily="49" charset="0"/>
-              <a:buChar char="o"/>
-            </a:pPr>
-            <a:r>
-              <a:rPr lang="en-US" sz="900" dirty="0">
-                <a:solidFill>
-                  <a:srgbClr val="FFFFFF"/>
-                </a:solidFill>
-              </a:rPr>
-              <a:t> Level out the workload (</a:t>
-            </a:r>
-            <a:r>
-              <a:rPr lang="en-US" sz="900" dirty="0" err="1">
-                <a:solidFill>
-                  <a:srgbClr val="FFFFFF"/>
-                </a:solidFill>
-              </a:rPr>
-              <a:t>heijunka</a:t>
-            </a:r>
-            <a:r>
-              <a:rPr lang="en-US" sz="900" dirty="0">
-                <a:solidFill>
-                  <a:srgbClr val="FFFFFF"/>
-                </a:solidFill>
-              </a:rPr>
-              <a:t>). (Work like the tortoise, not the hare.)</a:t>
-            </a:r>
-          </a:p>
-          <a:p>
-            <a:pPr>
-              <a:lnSpc>
-                <a:spcPct val="90000"/>
-              </a:lnSpc>
-              <a:buFont typeface="Courier New" panose="02070309020205020404" pitchFamily="49" charset="0"/>
-              <a:buChar char="o"/>
-            </a:pPr>
-            <a:r>
-              <a:rPr lang="en-US" sz="900" dirty="0">
-                <a:solidFill>
-                  <a:srgbClr val="FFFFFF"/>
-                </a:solidFill>
-              </a:rPr>
-              <a:t> Build a culture of stopping to fix problems, to get quality right from the start. (</a:t>
-            </a:r>
-            <a:r>
-              <a:rPr lang="en-US" sz="900" dirty="0" err="1">
-                <a:solidFill>
-                  <a:srgbClr val="FFFFFF"/>
-                </a:solidFill>
-              </a:rPr>
-              <a:t>Jidoka</a:t>
-            </a:r>
-            <a:r>
-              <a:rPr lang="en-US" sz="900" dirty="0">
-                <a:solidFill>
-                  <a:srgbClr val="FFFFFF"/>
-                </a:solidFill>
-              </a:rPr>
-              <a:t>)</a:t>
-            </a:r>
-          </a:p>
-          <a:p>
-            <a:pPr>
-              <a:lnSpc>
-                <a:spcPct val="90000"/>
-              </a:lnSpc>
-              <a:buFont typeface="Courier New" panose="02070309020205020404" pitchFamily="49" charset="0"/>
-              <a:buChar char="o"/>
-            </a:pPr>
-            <a:r>
-              <a:rPr lang="en-US" sz="900" dirty="0">
-                <a:solidFill>
-                  <a:srgbClr val="FFFFFF"/>
-                </a:solidFill>
-              </a:rPr>
-              <a:t> Standardized tasks are the foundation for continuous improvement and employee empowerment.</a:t>
-            </a:r>
-          </a:p>
-          <a:p>
-            <a:pPr>
-              <a:lnSpc>
-                <a:spcPct val="90000"/>
-              </a:lnSpc>
-              <a:buFont typeface="Courier New" panose="02070309020205020404" pitchFamily="49" charset="0"/>
-              <a:buChar char="o"/>
-            </a:pPr>
-            <a:r>
-              <a:rPr lang="en-US" sz="900" dirty="0">
-                <a:solidFill>
-                  <a:srgbClr val="FFFFFF"/>
-                </a:solidFill>
-              </a:rPr>
-              <a:t> Use visual control so no problems are hidden.</a:t>
-            </a:r>
-          </a:p>
-          <a:p>
-            <a:pPr>
-              <a:lnSpc>
-                <a:spcPct val="90000"/>
-              </a:lnSpc>
-              <a:buFont typeface="Courier New" panose="02070309020205020404" pitchFamily="49" charset="0"/>
-              <a:buChar char="o"/>
-            </a:pPr>
-            <a:r>
-              <a:rPr lang="en-US" sz="900" dirty="0">
-                <a:solidFill>
-                  <a:srgbClr val="FFFFFF"/>
-                </a:solidFill>
-              </a:rPr>
-              <a:t> Use only reliable, thoroughly tested technology that serves your people and processes.</a:t>
+              <a:t>Toyota</a:t>
             </a:r>
           </a:p>
         </p:txBody>
       </p:sp>
       <p:pic>
         <p:nvPicPr>
-          <p:cNvPr id="6" name="Picture 5" descr="A diagram of a process&#10;&#10;Description automatically generated">
-            <a:extLst>
-              <a:ext uri="{FF2B5EF4-FFF2-40B4-BE49-F238E27FC236}">
-                <a16:creationId xmlns:a16="http://schemas.microsoft.com/office/drawing/2014/main" id="{C8AE7262-4B97-32F2-3D9D-4FEF25E832B9}"/>
+          <p:cNvPr id="7" name="Content Placeholder 6">
+            <a:extLst>
+              <a:ext uri="{FF2B5EF4-FFF2-40B4-BE49-F238E27FC236}">
+                <a16:creationId xmlns:a16="http://schemas.microsoft.com/office/drawing/2014/main" id="{22E548EE-09EF-D4CC-B78B-F046D223457E}"/>
               </a:ext>
             </a:extLst>
           </p:cNvPr>
@@ -6216,24 +6839,118 @@
         </p:nvPicPr>
         <p:blipFill>
           <a:blip r:embed="rId2"/>
-          <a:stretch>
-            <a:fillRect/>
-          </a:stretch>
+          <a:srcRect l="13024" r="20446"/>
+          <a:stretch/>
         </p:blipFill>
         <p:spPr>
           <a:xfrm>
-            <a:off x="4742017" y="1941920"/>
-            <a:ext cx="6798082" cy="2974160"/>
+            <a:off x="-1" y="10"/>
+            <a:ext cx="8111272" cy="6857990"/>
           </a:xfrm>
           <a:prstGeom prst="rect">
             <a:avLst/>
           </a:prstGeom>
         </p:spPr>
       </p:pic>
+      <p:cxnSp>
+        <p:nvCxnSpPr>
+          <p:cNvPr id="16" name="Straight Connector 15">
+            <a:extLst>
+              <a:ext uri="{FF2B5EF4-FFF2-40B4-BE49-F238E27FC236}">
+                <a16:creationId xmlns:a16="http://schemas.microsoft.com/office/drawing/2014/main" id="{5A0A5CF6-407C-4691-8122-49DF69D0020D}"/>
+              </a:ext>
+              <a:ext uri="{C183D7F6-B498-43B3-948B-1728B52AA6E4}">
+                <adec:decorative xmlns:adec="http://schemas.microsoft.com/office/drawing/2017/decorative" val="1"/>
+              </a:ext>
+            </a:extLst>
+          </p:cNvPr>
+          <p:cNvCxnSpPr>
+            <a:cxnSpLocks noGrp="1" noRot="1" noChangeAspect="1" noMove="1" noResize="1" noEditPoints="1" noAdjustHandles="1" noChangeArrowheads="1" noChangeShapeType="1"/>
+          </p:cNvCxnSpPr>
+          <p:nvPr>
+            <p:extLst>
+              <p:ext uri="{386F3935-93C4-4BCD-93E2-E3B085C9AB24}">
+                <p16:designElem xmlns:p16="http://schemas.microsoft.com/office/powerpoint/2015/main" val="1"/>
+              </p:ext>
+            </p:extLst>
+          </p:nvPr>
+        </p:nvCxnSpPr>
+        <p:spPr>
+          <a:xfrm>
+            <a:off x="8730145" y="2633962"/>
+            <a:ext cx="2926080" cy="0"/>
+          </a:xfrm>
+          <a:prstGeom prst="line">
+            <a:avLst/>
+          </a:prstGeom>
+          <a:ln w="12700">
+            <a:solidFill>
+              <a:schemeClr val="tx1">
+                <a:lumMod val="75000"/>
+                <a:lumOff val="25000"/>
+              </a:schemeClr>
+            </a:solidFill>
+          </a:ln>
+        </p:spPr>
+        <p:style>
+          <a:lnRef idx="1">
+            <a:schemeClr val="accent1"/>
+          </a:lnRef>
+          <a:fillRef idx="0">
+            <a:schemeClr val="accent1"/>
+          </a:fillRef>
+          <a:effectRef idx="0">
+            <a:schemeClr val="accent1"/>
+          </a:effectRef>
+          <a:fontRef idx="minor">
+            <a:schemeClr val="tx1"/>
+          </a:fontRef>
+        </p:style>
+      </p:cxnSp>
+      <p:sp>
+        <p:nvSpPr>
+          <p:cNvPr id="11" name="Content Placeholder 10">
+            <a:extLst>
+              <a:ext uri="{FF2B5EF4-FFF2-40B4-BE49-F238E27FC236}">
+                <a16:creationId xmlns:a16="http://schemas.microsoft.com/office/drawing/2014/main" id="{2508E9ED-F2A4-7E54-16CB-5DD13FF0042E}"/>
+              </a:ext>
+            </a:extLst>
+          </p:cNvPr>
+          <p:cNvSpPr>
+            <a:spLocks noGrp="1"/>
+          </p:cNvSpPr>
+          <p:nvPr>
+            <p:ph idx="1"/>
+          </p:nvPr>
+        </p:nvSpPr>
+        <p:spPr>
+          <a:xfrm>
+            <a:off x="8614786" y="3429000"/>
+            <a:ext cx="3084844" cy="1519514"/>
+          </a:xfrm>
+        </p:spPr>
+        <p:txBody>
+          <a:bodyPr>
+            <a:normAutofit/>
+          </a:bodyPr>
+          <a:lstStyle/>
+          <a:p>
+            <a:r>
+              <a:rPr lang="en-US" sz="1600" dirty="0"/>
+              <a:t>“Toyota’s real innovation is its ability to harness the intellect of ‘ordinary’ employees” – Mary and Tom </a:t>
+            </a:r>
+            <a:r>
+              <a:rPr lang="en-US" sz="1600" dirty="0" err="1"/>
+              <a:t>Poppendieck</a:t>
+            </a:r>
+            <a:endParaRPr lang="en-US" sz="1600" dirty="0"/>
+          </a:p>
+        </p:txBody>
+      </p:sp>
     </p:spTree>
     <p:extLst>
       <p:ext uri="{BB962C8B-B14F-4D97-AF65-F5344CB8AC3E}">
-        <p14:creationId xmlns:p14="http://schemas.microsoft.com/office/powerpoint/2010/main" val="1801810148"/>
+        <p14:creationId xmlns:p14="http://schemas.microsoft.com/office/powerpoint/2010/main" val="945415510"/>
       </p:ext>
     </p:extLst>
   </p:cSld>

</xml_diff>

<commit_message>
Division of labor ppt almost done.
</commit_message>
<xml_diff>
--- a/present/DivisionOfLabor.pptx
+++ b/present/DivisionOfLabor.pptx
@@ -23,6 +23,7 @@
     <p:sldId id="271" r:id="rId17"/>
     <p:sldId id="272" r:id="rId18"/>
     <p:sldId id="273" r:id="rId19"/>
+    <p:sldId id="274" r:id="rId20"/>
   </p:sldIdLst>
   <p:sldSz cx="12192000" cy="6858000"/>
   <p:notesSz cx="6858000" cy="9144000"/>
@@ -7410,8 +7411,18 @@
               <a:buChar char="•"/>
             </a:pPr>
             <a:r>
-              <a:rPr lang="en-US"/>
+              <a:rPr lang="en-US" dirty="0"/>
               <a:t> Infrastructure as code</a:t>
+            </a:r>
+          </a:p>
+          <a:p>
+            <a:pPr>
+              <a:buFont typeface="Arial" panose="020B0604020202020204" pitchFamily="34" charset="0"/>
+              <a:buChar char="•"/>
+            </a:pPr>
+            <a:r>
+              <a:rPr lang="en-US" dirty="0"/>
+              <a:t> Monitoring</a:t>
             </a:r>
           </a:p>
         </p:txBody>
@@ -7482,6 +7493,335 @@
     <p:extLst>
       <p:ext uri="{BB962C8B-B14F-4D97-AF65-F5344CB8AC3E}">
         <p14:creationId xmlns:p14="http://schemas.microsoft.com/office/powerpoint/2010/main" val="1145960285"/>
+      </p:ext>
+    </p:extLst>
+  </p:cSld>
+  <p:clrMapOvr>
+    <a:masterClrMapping/>
+  </p:clrMapOvr>
+</p:sld>
+</file>
+
+<file path=ppt/slides/slide19.xml><?xml version="1.0" encoding="utf-8"?>
+<p:sld xmlns:a="http://schemas.openxmlformats.org/drawingml/2006/main" xmlns:r="http://schemas.openxmlformats.org/officeDocument/2006/relationships" xmlns:p="http://schemas.openxmlformats.org/presentationml/2006/main">
+  <p:cSld>
+    <p:bg>
+      <p:bgPr>
+        <a:solidFill>
+          <a:schemeClr val="bg1"/>
+        </a:solidFill>
+        <a:effectLst/>
+      </p:bgPr>
+    </p:bg>
+    <p:spTree>
+      <p:nvGrpSpPr>
+        <p:cNvPr id="1" name=""/>
+        <p:cNvGrpSpPr/>
+        <p:nvPr/>
+      </p:nvGrpSpPr>
+      <p:grpSpPr>
+        <a:xfrm>
+          <a:off x="0" y="0"/>
+          <a:ext cx="0" cy="0"/>
+          <a:chOff x="0" y="0"/>
+          <a:chExt cx="0" cy="0"/>
+        </a:xfrm>
+      </p:grpSpPr>
+      <p:sp useBgFill="1">
+        <p:nvSpPr>
+          <p:cNvPr id="10" name="Rectangle 9">
+            <a:extLst>
+              <a:ext uri="{FF2B5EF4-FFF2-40B4-BE49-F238E27FC236}">
+                <a16:creationId xmlns:a16="http://schemas.microsoft.com/office/drawing/2014/main" id="{08CB54FC-0B2A-4107-9A70-958B90B76585}"/>
+              </a:ext>
+              <a:ext uri="{C183D7F6-B498-43B3-948B-1728B52AA6E4}">
+                <adec:decorative xmlns:adec="http://schemas.microsoft.com/office/drawing/2017/decorative" val="1"/>
+              </a:ext>
+            </a:extLst>
+          </p:cNvPr>
+          <p:cNvSpPr>
+            <a:spLocks noGrp="1" noRot="1" noChangeAspect="1" noMove="1" noResize="1" noEditPoints="1" noAdjustHandles="1" noChangeArrowheads="1" noChangeShapeType="1" noTextEdit="1"/>
+          </p:cNvSpPr>
+          <p:nvPr>
+            <p:extLst>
+              <p:ext uri="{386F3935-93C4-4BCD-93E2-E3B085C9AB24}">
+                <p16:designElem xmlns:p16="http://schemas.microsoft.com/office/powerpoint/2015/main" val="1"/>
+              </p:ext>
+            </p:extLst>
+          </p:nvPr>
+        </p:nvSpPr>
+        <p:spPr>
+          <a:xfrm>
+            <a:off x="0" y="0"/>
+            <a:ext cx="12192001" cy="6858000"/>
+          </a:xfrm>
+          <a:prstGeom prst="rect">
+            <a:avLst/>
+          </a:prstGeom>
+          <a:ln>
+            <a:noFill/>
+          </a:ln>
+        </p:spPr>
+        <p:style>
+          <a:lnRef idx="2">
+            <a:schemeClr val="accent1">
+              <a:shade val="50000"/>
+            </a:schemeClr>
+          </a:lnRef>
+          <a:fillRef idx="1">
+            <a:schemeClr val="accent1"/>
+          </a:fillRef>
+          <a:effectRef idx="0">
+            <a:schemeClr val="accent1"/>
+          </a:effectRef>
+          <a:fontRef idx="minor">
+            <a:schemeClr val="lt1"/>
+          </a:fontRef>
+        </p:style>
+        <p:txBody>
+          <a:bodyPr rtlCol="0" anchor="ctr"/>
+          <a:lstStyle/>
+          <a:p>
+            <a:pPr algn="ctr"/>
+            <a:endParaRPr lang="en-US"/>
+          </a:p>
+        </p:txBody>
+      </p:sp>
+      <p:sp>
+        <p:nvSpPr>
+          <p:cNvPr id="2" name="Title 1">
+            <a:extLst>
+              <a:ext uri="{FF2B5EF4-FFF2-40B4-BE49-F238E27FC236}">
+                <a16:creationId xmlns:a16="http://schemas.microsoft.com/office/drawing/2014/main" id="{6D24EB82-F836-33B9-F5A4-1481A3101BE3}"/>
+              </a:ext>
+            </a:extLst>
+          </p:cNvPr>
+          <p:cNvSpPr>
+            <a:spLocks noGrp="1"/>
+          </p:cNvSpPr>
+          <p:nvPr>
+            <p:ph type="title"/>
+          </p:nvPr>
+        </p:nvSpPr>
+        <p:spPr>
+          <a:xfrm>
+            <a:off x="6411685" y="634946"/>
+            <a:ext cx="5127171" cy="1450757"/>
+          </a:xfrm>
+        </p:spPr>
+        <p:txBody>
+          <a:bodyPr>
+            <a:normAutofit/>
+          </a:bodyPr>
+          <a:lstStyle/>
+          <a:p>
+            <a:r>
+              <a:rPr lang="en-US" sz="4900" dirty="0"/>
+              <a:t>Here Comes Everybody!</a:t>
+            </a:r>
+          </a:p>
+        </p:txBody>
+      </p:sp>
+      <p:pic>
+        <p:nvPicPr>
+          <p:cNvPr id="7" name="Graphic 6" descr="Recycle Sign">
+            <a:extLst>
+              <a:ext uri="{FF2B5EF4-FFF2-40B4-BE49-F238E27FC236}">
+                <a16:creationId xmlns:a16="http://schemas.microsoft.com/office/drawing/2014/main" id="{4298EE93-219D-BA68-CEA9-8DE55575C1AB}"/>
+              </a:ext>
+            </a:extLst>
+          </p:cNvPr>
+          <p:cNvPicPr>
+            <a:picLocks noChangeAspect="1"/>
+          </p:cNvPicPr>
+          <p:nvPr/>
+        </p:nvPicPr>
+        <p:blipFill>
+          <a:blip r:embed="rId2">
+            <a:extLst>
+              <a:ext uri="{28A0092B-C50C-407E-A947-70E740481C1C}">
+                <a14:useLocalDpi xmlns:a14="http://schemas.microsoft.com/office/drawing/2010/main" val="0"/>
+              </a:ext>
+              <a:ext uri="{96DAC541-7B7A-43D3-8B79-37D633B846F1}">
+                <asvg:svgBlip xmlns:asvg="http://schemas.microsoft.com/office/drawing/2016/SVG/main" r:embed="rId3"/>
+              </a:ext>
+            </a:extLst>
+          </a:blip>
+          <a:stretch>
+            <a:fillRect/>
+          </a:stretch>
+        </p:blipFill>
+        <p:spPr>
+          <a:xfrm>
+            <a:off x="643192" y="711306"/>
+            <a:ext cx="5115347" cy="5115347"/>
+          </a:xfrm>
+          <a:prstGeom prst="rect">
+            <a:avLst/>
+          </a:prstGeom>
+        </p:spPr>
+      </p:pic>
+      <p:cxnSp>
+        <p:nvCxnSpPr>
+          <p:cNvPr id="12" name="Straight Connector 11">
+            <a:extLst>
+              <a:ext uri="{FF2B5EF4-FFF2-40B4-BE49-F238E27FC236}">
+                <a16:creationId xmlns:a16="http://schemas.microsoft.com/office/drawing/2014/main" id="{7855A9B5-1710-4B19-B0F1-CDFDD4ED5B7E}"/>
+              </a:ext>
+              <a:ext uri="{C183D7F6-B498-43B3-948B-1728B52AA6E4}">
+                <adec:decorative xmlns:adec="http://schemas.microsoft.com/office/drawing/2017/decorative" val="1"/>
+              </a:ext>
+            </a:extLst>
+          </p:cNvPr>
+          <p:cNvCxnSpPr>
+            <a:cxnSpLocks noGrp="1" noRot="1" noChangeAspect="1" noMove="1" noResize="1" noEditPoints="1" noAdjustHandles="1" noChangeArrowheads="1" noChangeShapeType="1"/>
+          </p:cNvCxnSpPr>
+          <p:nvPr>
+            <p:extLst>
+              <p:ext uri="{386F3935-93C4-4BCD-93E2-E3B085C9AB24}">
+                <p16:designElem xmlns:p16="http://schemas.microsoft.com/office/powerpoint/2015/main" val="1"/>
+              </p:ext>
+            </p:extLst>
+          </p:nvPr>
+        </p:nvCxnSpPr>
+        <p:spPr>
+          <a:xfrm>
+            <a:off x="6514044" y="2246569"/>
+            <a:ext cx="4572000" cy="0"/>
+          </a:xfrm>
+          <a:prstGeom prst="line">
+            <a:avLst/>
+          </a:prstGeom>
+          <a:ln w="12700">
+            <a:solidFill>
+              <a:schemeClr val="tx1">
+                <a:lumMod val="75000"/>
+                <a:lumOff val="25000"/>
+              </a:schemeClr>
+            </a:solidFill>
+          </a:ln>
+        </p:spPr>
+        <p:style>
+          <a:lnRef idx="1">
+            <a:schemeClr val="accent1"/>
+          </a:lnRef>
+          <a:fillRef idx="0">
+            <a:schemeClr val="accent1"/>
+          </a:fillRef>
+          <a:effectRef idx="0">
+            <a:schemeClr val="accent1"/>
+          </a:effectRef>
+          <a:fontRef idx="minor">
+            <a:schemeClr val="tx1"/>
+          </a:fontRef>
+        </p:style>
+      </p:cxnSp>
+      <p:sp>
+        <p:nvSpPr>
+          <p:cNvPr id="3" name="Content Placeholder 2">
+            <a:extLst>
+              <a:ext uri="{FF2B5EF4-FFF2-40B4-BE49-F238E27FC236}">
+                <a16:creationId xmlns:a16="http://schemas.microsoft.com/office/drawing/2014/main" id="{6B242A64-B7C2-9CAE-AE31-C594B87386A0}"/>
+              </a:ext>
+            </a:extLst>
+          </p:cNvPr>
+          <p:cNvSpPr>
+            <a:spLocks noGrp="1"/>
+          </p:cNvSpPr>
+          <p:nvPr>
+            <p:ph idx="1"/>
+          </p:nvPr>
+        </p:nvSpPr>
+        <p:spPr>
+          <a:xfrm>
+            <a:off x="6411684" y="2407436"/>
+            <a:ext cx="5127172" cy="3461658"/>
+          </a:xfrm>
+        </p:spPr>
+        <p:txBody>
+          <a:bodyPr>
+            <a:normAutofit/>
+          </a:bodyPr>
+          <a:lstStyle/>
+          <a:p>
+            <a:r>
+              <a:rPr lang="en-US" dirty="0"/>
+              <a:t>“Successful lean initiatives must be based first and foremost on a deep respect for every person in the company, especially the ‘ordinary’ people who make the product or pound out the code.” – Mary and Tom </a:t>
+            </a:r>
+            <a:r>
+              <a:rPr lang="en-US"/>
+              <a:t>Poppendieck</a:t>
+            </a:r>
+            <a:endParaRPr lang="en-US" dirty="0"/>
+          </a:p>
+        </p:txBody>
+      </p:sp>
+      <p:sp>
+        <p:nvSpPr>
+          <p:cNvPr id="14" name="Rectangle 13">
+            <a:extLst>
+              <a:ext uri="{FF2B5EF4-FFF2-40B4-BE49-F238E27FC236}">
+                <a16:creationId xmlns:a16="http://schemas.microsoft.com/office/drawing/2014/main" id="{9AA76026-5689-4584-8D93-D71D739E61B5}"/>
+              </a:ext>
+              <a:ext uri="{C183D7F6-B498-43B3-948B-1728B52AA6E4}">
+                <adec:decorative xmlns:adec="http://schemas.microsoft.com/office/drawing/2017/decorative" val="1"/>
+              </a:ext>
+            </a:extLst>
+          </p:cNvPr>
+          <p:cNvSpPr>
+            <a:spLocks noGrp="1" noRot="1" noChangeAspect="1" noMove="1" noResize="1" noEditPoints="1" noAdjustHandles="1" noChangeArrowheads="1" noChangeShapeType="1" noTextEdit="1"/>
+          </p:cNvSpPr>
+          <p:nvPr>
+            <p:extLst>
+              <p:ext uri="{386F3935-93C4-4BCD-93E2-E3B085C9AB24}">
+                <p16:designElem xmlns:p16="http://schemas.microsoft.com/office/powerpoint/2015/main" val="1"/>
+              </p:ext>
+            </p:extLst>
+          </p:nvPr>
+        </p:nvSpPr>
+        <p:spPr>
+          <a:xfrm>
+            <a:off x="0" y="6400800"/>
+            <a:ext cx="12192000" cy="457200"/>
+          </a:xfrm>
+          <a:prstGeom prst="rect">
+            <a:avLst/>
+          </a:prstGeom>
+          <a:solidFill>
+            <a:srgbClr val="262626"/>
+          </a:solidFill>
+          <a:ln>
+            <a:noFill/>
+          </a:ln>
+        </p:spPr>
+        <p:style>
+          <a:lnRef idx="2">
+            <a:schemeClr val="accent1">
+              <a:shade val="50000"/>
+            </a:schemeClr>
+          </a:lnRef>
+          <a:fillRef idx="1">
+            <a:schemeClr val="accent1"/>
+          </a:fillRef>
+          <a:effectRef idx="0">
+            <a:schemeClr val="accent1"/>
+          </a:effectRef>
+          <a:fontRef idx="minor">
+            <a:schemeClr val="lt1"/>
+          </a:fontRef>
+        </p:style>
+        <p:txBody>
+          <a:bodyPr/>
+          <a:lstStyle/>
+          <a:p>
+            <a:endParaRPr lang="en-US"/>
+          </a:p>
+        </p:txBody>
+      </p:sp>
+    </p:spTree>
+    <p:extLst>
+      <p:ext uri="{BB962C8B-B14F-4D97-AF65-F5344CB8AC3E}">
+        <p14:creationId xmlns:p14="http://schemas.microsoft.com/office/powerpoint/2010/main" val="2916333894"/>
       </p:ext>
     </p:extLst>
   </p:cSld>

</xml_diff>

<commit_message>
Finished ppt for devops division talk.
</commit_message>
<xml_diff>
--- a/present/DivisionOfLabor.pptx
+++ b/present/DivisionOfLabor.pptx
@@ -374,7 +374,7 @@
           <a:p>
             <a:fld id="{9184DA70-C731-4C70-880D-CCD4705E623C}" type="datetime1">
               <a:rPr lang="en-US" smtClean="0"/>
-              <a:t>10/22/24</a:t>
+              <a:t>10/24/24</a:t>
             </a:fld>
             <a:endParaRPr lang="en-US" dirty="0"/>
           </a:p>
@@ -562,7 +562,7 @@
           <a:p>
             <a:fld id="{B612A279-0833-481D-8C56-F67FD0AC6C50}" type="datetime1">
               <a:rPr lang="en-US" smtClean="0"/>
-              <a:t>10/22/24</a:t>
+              <a:t>10/24/24</a:t>
             </a:fld>
             <a:endParaRPr lang="en-US" dirty="0"/>
           </a:p>
@@ -804,7 +804,7 @@
           <a:p>
             <a:fld id="{6587DA83-5663-4C9C-B9AA-0B40A3DAFF81}" type="datetime1">
               <a:rPr lang="en-US" smtClean="0"/>
-              <a:t>10/22/24</a:t>
+              <a:t>10/24/24</a:t>
             </a:fld>
             <a:endParaRPr lang="en-US" dirty="0"/>
           </a:p>
@@ -992,7 +992,7 @@
           <a:p>
             <a:fld id="{4BE1D723-8F53-4F53-90B0-1982A396982E}" type="datetime1">
               <a:rPr lang="en-US" smtClean="0"/>
-              <a:t>10/22/24</a:t>
+              <a:t>10/24/24</a:t>
             </a:fld>
             <a:endParaRPr lang="en-US" dirty="0"/>
           </a:p>
@@ -1365,7 +1365,7 @@
           <a:p>
             <a:fld id="{97669AF7-7BEB-44E4-9852-375E34362B5B}" type="datetime1">
               <a:rPr lang="en-US" smtClean="0"/>
-              <a:t>10/22/24</a:t>
+              <a:t>10/24/24</a:t>
             </a:fld>
             <a:endParaRPr lang="en-US" dirty="0"/>
           </a:p>
@@ -1620,7 +1620,7 @@
           <a:p>
             <a:fld id="{BAAAC38D-0552-4C82-B593-E6124DFADBE2}" type="datetime1">
               <a:rPr lang="en-US" smtClean="0"/>
-              <a:t>10/22/24</a:t>
+              <a:t>10/24/24</a:t>
             </a:fld>
             <a:endParaRPr lang="en-US" dirty="0"/>
           </a:p>
@@ -2017,7 +2017,7 @@
           <a:p>
             <a:fld id="{D9DF0F1C-5577-4ACB-BB62-DF8F3C494C7E}" type="datetime1">
               <a:rPr lang="en-US" smtClean="0"/>
-              <a:t>10/22/24</a:t>
+              <a:t>10/24/24</a:t>
             </a:fld>
             <a:endParaRPr lang="en-US" dirty="0"/>
           </a:p>
@@ -2153,7 +2153,7 @@
           <a:p>
             <a:fld id="{1775B394-D9F9-4F0C-B15D-605F45CB9E9F}" type="datetime1">
               <a:rPr lang="en-US" smtClean="0"/>
-              <a:t>10/22/24</a:t>
+              <a:t>10/24/24</a:t>
             </a:fld>
             <a:endParaRPr lang="en-US" dirty="0"/>
           </a:p>
@@ -2310,7 +2310,7 @@
           <a:p>
             <a:fld id="{39667345-2558-425A-8533-9BFDBCE15005}" type="datetime1">
               <a:rPr lang="en-US" smtClean="0"/>
-              <a:t>10/22/24</a:t>
+              <a:t>10/24/24</a:t>
             </a:fld>
             <a:endParaRPr lang="en-US" dirty="0"/>
           </a:p>
@@ -2639,7 +2639,7 @@
           <a:p>
             <a:fld id="{92BEA474-078D-4E9B-9B14-09A87B19DC46}" type="datetime1">
               <a:rPr lang="en-US" smtClean="0"/>
-              <a:t>10/22/24</a:t>
+              <a:t>10/24/24</a:t>
             </a:fld>
             <a:endParaRPr lang="en-US" dirty="0"/>
           </a:p>
@@ -2989,7 +2989,7 @@
           <a:p>
             <a:fld id="{4907D986-8816-4272-A432-0437A28A9828}" type="datetime1">
               <a:rPr lang="en-US" smtClean="0"/>
-              <a:t>10/22/24</a:t>
+              <a:t>10/24/24</a:t>
             </a:fld>
             <a:endParaRPr lang="en-US" dirty="0"/>
           </a:p>
@@ -3250,7 +3250,7 @@
           <a:p>
             <a:fld id="{62D6E202-B606-4609-B914-27C9371A1F6D}" type="datetime1">
               <a:rPr lang="en-US" smtClean="0"/>
-              <a:t>10/22/24</a:t>
+              <a:t>10/24/24</a:t>
             </a:fld>
             <a:endParaRPr lang="en-US" dirty="0"/>
           </a:p>
@@ -7529,10 +7529,10 @@
       </p:grpSpPr>
       <p:sp useBgFill="1">
         <p:nvSpPr>
-          <p:cNvPr id="10" name="Rectangle 9">
-            <a:extLst>
-              <a:ext uri="{FF2B5EF4-FFF2-40B4-BE49-F238E27FC236}">
-                <a16:creationId xmlns:a16="http://schemas.microsoft.com/office/drawing/2014/main" id="{08CB54FC-0B2A-4107-9A70-958B90B76585}"/>
+          <p:cNvPr id="19" name="Rectangle 18">
+            <a:extLst>
+              <a:ext uri="{FF2B5EF4-FFF2-40B4-BE49-F238E27FC236}">
+                <a16:creationId xmlns:a16="http://schemas.microsoft.com/office/drawing/2014/main" id="{990D0034-F768-41E7-85D4-F38C4DE85770}"/>
               </a:ext>
               <a:ext uri="{C183D7F6-B498-43B3-948B-1728B52AA6E4}">
                 <adec:decorative xmlns:adec="http://schemas.microsoft.com/office/drawing/2017/decorative" val="1"/>
@@ -7552,8 +7552,8 @@
         </p:nvSpPr>
         <p:spPr>
           <a:xfrm>
-            <a:off x="0" y="0"/>
-            <a:ext cx="12192001" cy="6858000"/>
+            <a:off x="5685" y="0"/>
+            <a:ext cx="12186315" cy="6858000"/>
           </a:xfrm>
           <a:prstGeom prst="rect">
             <a:avLst/>
@@ -7564,15 +7564,15 @@
         </p:spPr>
         <p:style>
           <a:lnRef idx="2">
-            <a:schemeClr val="accent1">
+            <a:schemeClr val="accent6">
               <a:shade val="50000"/>
             </a:schemeClr>
           </a:lnRef>
-          <a:fillRef idx="1">
-            <a:schemeClr val="accent1"/>
+          <a:fillRef idx="1001">
+            <a:schemeClr val="lt1"/>
           </a:fillRef>
           <a:effectRef idx="0">
-            <a:schemeClr val="accent1"/>
+            <a:schemeClr val="accent6"/>
           </a:effectRef>
           <a:fontRef idx="minor">
             <a:schemeClr val="lt1"/>
@@ -7605,8 +7605,8 @@
         </p:nvSpPr>
         <p:spPr>
           <a:xfrm>
-            <a:off x="6411685" y="634946"/>
-            <a:ext cx="5127171" cy="1450757"/>
+            <a:off x="8614786" y="516836"/>
+            <a:ext cx="3100136" cy="1960234"/>
           </a:xfrm>
         </p:spPr>
         <p:txBody>
@@ -7616,7 +7616,11 @@
           <a:lstStyle/>
           <a:p>
             <a:r>
-              <a:rPr lang="en-US" sz="4900" dirty="0"/>
+              <a:rPr lang="en-US" sz="4400">
+                <a:solidFill>
+                  <a:srgbClr val="E72983"/>
+                </a:solidFill>
+              </a:rPr>
               <a:t>Here Comes Everybody!</a:t>
             </a:r>
           </a:p>
@@ -7624,10 +7628,10 @@
       </p:sp>
       <p:pic>
         <p:nvPicPr>
-          <p:cNvPr id="7" name="Graphic 6" descr="Recycle Sign">
-            <a:extLst>
-              <a:ext uri="{FF2B5EF4-FFF2-40B4-BE49-F238E27FC236}">
-                <a16:creationId xmlns:a16="http://schemas.microsoft.com/office/drawing/2014/main" id="{4298EE93-219D-BA68-CEA9-8DE55575C1AB}"/>
+          <p:cNvPr id="5" name="Picture 4">
+            <a:extLst>
+              <a:ext uri="{FF2B5EF4-FFF2-40B4-BE49-F238E27FC236}">
+                <a16:creationId xmlns:a16="http://schemas.microsoft.com/office/drawing/2014/main" id="{845E9F92-F1D1-339D-71F0-98635774AFAB}"/>
               </a:ext>
             </a:extLst>
           </p:cNvPr>
@@ -7637,24 +7641,14 @@
           <p:nvPr/>
         </p:nvPicPr>
         <p:blipFill>
-          <a:blip r:embed="rId2">
-            <a:extLst>
-              <a:ext uri="{28A0092B-C50C-407E-A947-70E740481C1C}">
-                <a14:useLocalDpi xmlns:a14="http://schemas.microsoft.com/office/drawing/2010/main" val="0"/>
-              </a:ext>
-              <a:ext uri="{96DAC541-7B7A-43D3-8B79-37D633B846F1}">
-                <asvg:svgBlip xmlns:asvg="http://schemas.microsoft.com/office/drawing/2016/SVG/main" r:embed="rId3"/>
-              </a:ext>
-            </a:extLst>
-          </a:blip>
-          <a:stretch>
-            <a:fillRect/>
-          </a:stretch>
+          <a:blip r:embed="rId2"/>
+          <a:srcRect l="13364"/>
+          <a:stretch/>
         </p:blipFill>
         <p:spPr>
           <a:xfrm>
-            <a:off x="643192" y="711306"/>
-            <a:ext cx="5115347" cy="5115347"/>
+            <a:off x="-1" y="10"/>
+            <a:ext cx="8111272" cy="6857990"/>
           </a:xfrm>
           <a:prstGeom prst="rect">
             <a:avLst/>
@@ -7663,10 +7657,10 @@
       </p:pic>
       <p:cxnSp>
         <p:nvCxnSpPr>
-          <p:cNvPr id="12" name="Straight Connector 11">
-            <a:extLst>
-              <a:ext uri="{FF2B5EF4-FFF2-40B4-BE49-F238E27FC236}">
-                <a16:creationId xmlns:a16="http://schemas.microsoft.com/office/drawing/2014/main" id="{7855A9B5-1710-4B19-B0F1-CDFDD4ED5B7E}"/>
+          <p:cNvPr id="21" name="Straight Connector 20">
+            <a:extLst>
+              <a:ext uri="{FF2B5EF4-FFF2-40B4-BE49-F238E27FC236}">
+                <a16:creationId xmlns:a16="http://schemas.microsoft.com/office/drawing/2014/main" id="{5A0A5CF6-407C-4691-8122-49DF69D0020D}"/>
               </a:ext>
               <a:ext uri="{C183D7F6-B498-43B3-948B-1728B52AA6E4}">
                 <adec:decorative xmlns:adec="http://schemas.microsoft.com/office/drawing/2017/decorative" val="1"/>
@@ -7686,8 +7680,8 @@
         </p:nvCxnSpPr>
         <p:spPr>
           <a:xfrm>
-            <a:off x="6514044" y="2246569"/>
-            <a:ext cx="4572000" cy="0"/>
+            <a:off x="8730145" y="2633962"/>
+            <a:ext cx="2926080" cy="0"/>
           </a:xfrm>
           <a:prstGeom prst="line">
             <a:avLst/>
@@ -7734,8 +7728,8 @@
         </p:nvSpPr>
         <p:spPr>
           <a:xfrm>
-            <a:off x="6411684" y="2407436"/>
-            <a:ext cx="5127172" cy="3461658"/>
+            <a:off x="8614786" y="2790855"/>
+            <a:ext cx="3084844" cy="3311766"/>
           </a:xfrm>
         </p:spPr>
         <p:txBody>
@@ -7745,76 +7739,9 @@
           <a:lstStyle/>
           <a:p>
             <a:r>
-              <a:rPr lang="en-US" dirty="0"/>
-              <a:t>“Successful lean initiatives must be based first and foremost on a deep respect for every person in the company, especially the ‘ordinary’ people who make the product or pound out the code.” – Mary and Tom </a:t>
-            </a:r>
-            <a:r>
-              <a:rPr lang="en-US"/>
-              <a:t>Poppendieck</a:t>
-            </a:r>
-            <a:endParaRPr lang="en-US" dirty="0"/>
-          </a:p>
-        </p:txBody>
-      </p:sp>
-      <p:sp>
-        <p:nvSpPr>
-          <p:cNvPr id="14" name="Rectangle 13">
-            <a:extLst>
-              <a:ext uri="{FF2B5EF4-FFF2-40B4-BE49-F238E27FC236}">
-                <a16:creationId xmlns:a16="http://schemas.microsoft.com/office/drawing/2014/main" id="{9AA76026-5689-4584-8D93-D71D739E61B5}"/>
-              </a:ext>
-              <a:ext uri="{C183D7F6-B498-43B3-948B-1728B52AA6E4}">
-                <adec:decorative xmlns:adec="http://schemas.microsoft.com/office/drawing/2017/decorative" val="1"/>
-              </a:ext>
-            </a:extLst>
-          </p:cNvPr>
-          <p:cNvSpPr>
-            <a:spLocks noGrp="1" noRot="1" noChangeAspect="1" noMove="1" noResize="1" noEditPoints="1" noAdjustHandles="1" noChangeArrowheads="1" noChangeShapeType="1" noTextEdit="1"/>
-          </p:cNvSpPr>
-          <p:nvPr>
-            <p:extLst>
-              <p:ext uri="{386F3935-93C4-4BCD-93E2-E3B085C9AB24}">
-                <p16:designElem xmlns:p16="http://schemas.microsoft.com/office/powerpoint/2015/main" val="1"/>
-              </p:ext>
-            </p:extLst>
-          </p:nvPr>
-        </p:nvSpPr>
-        <p:spPr>
-          <a:xfrm>
-            <a:off x="0" y="6400800"/>
-            <a:ext cx="12192000" cy="457200"/>
-          </a:xfrm>
-          <a:prstGeom prst="rect">
-            <a:avLst/>
-          </a:prstGeom>
-          <a:solidFill>
-            <a:srgbClr val="262626"/>
-          </a:solidFill>
-          <a:ln>
-            <a:noFill/>
-          </a:ln>
-        </p:spPr>
-        <p:style>
-          <a:lnRef idx="2">
-            <a:schemeClr val="accent1">
-              <a:shade val="50000"/>
-            </a:schemeClr>
-          </a:lnRef>
-          <a:fillRef idx="1">
-            <a:schemeClr val="accent1"/>
-          </a:fillRef>
-          <a:effectRef idx="0">
-            <a:schemeClr val="accent1"/>
-          </a:effectRef>
-          <a:fontRef idx="minor">
-            <a:schemeClr val="lt1"/>
-          </a:fontRef>
-        </p:style>
-        <p:txBody>
-          <a:bodyPr/>
-          <a:lstStyle/>
-          <a:p>
-            <a:endParaRPr lang="en-US"/>
+              <a:rPr lang="en-US" sz="1600"/>
+              <a:t>“Successful lean initiatives must be based first and foremost on a deep respect for every person in the company, especially the ‘ordinary’ people who make the product or pound out the code.” – Mary and Tom Poppendieck</a:t>
+            </a:r>
           </a:p>
         </p:txBody>
       </p:sp>

</xml_diff>